<commit_message>
Update the pdf and ppt
</commit_message>
<xml_diff>
--- a/Spin_echo_12echo_HW1/MRI_HW1_M11107309.pptx
+++ b/Spin_echo_12echo_HW1/MRI_HW1_M11107309.pptx
@@ -5,7 +5,7 @@
     <p:sldMasterId id="2147483648" r:id="rId1"/>
   </p:sldMasterIdLst>
   <p:notesMasterIdLst>
-    <p:notesMasterId r:id="rId19"/>
+    <p:notesMasterId r:id="rId21"/>
   </p:notesMasterIdLst>
   <p:sldIdLst>
     <p:sldId id="256" r:id="rId2"/>
@@ -22,9 +22,11 @@
     <p:sldId id="273" r:id="rId13"/>
     <p:sldId id="268" r:id="rId14"/>
     <p:sldId id="272" r:id="rId15"/>
-    <p:sldId id="269" r:id="rId16"/>
-    <p:sldId id="271" r:id="rId17"/>
-    <p:sldId id="305" r:id="rId18"/>
+    <p:sldId id="307" r:id="rId16"/>
+    <p:sldId id="306" r:id="rId17"/>
+    <p:sldId id="269" r:id="rId18"/>
+    <p:sldId id="271" r:id="rId19"/>
+    <p:sldId id="305" r:id="rId20"/>
   </p:sldIdLst>
   <p:sldSz cx="12192000" cy="6858000"/>
   <p:notesSz cx="6858000" cy="9144000"/>
@@ -213,7 +215,7 @@
           <a:p>
             <a:fld id="{824215CE-41C6-465E-9183-51FFFBBEE69D}" type="datetimeFigureOut">
               <a:rPr lang="zh-TW" altLang="en-US" smtClean="0"/>
-              <a:t>2022/10/11</a:t>
+              <a:t>2022/10/16</a:t>
             </a:fld>
             <a:endParaRPr lang="zh-TW" altLang="en-US"/>
           </a:p>
@@ -711,7 +713,7 @@
           <a:p>
             <a:fld id="{CCBF0A4F-D4AC-415A-8379-F71647B914E2}" type="datetime1">
               <a:rPr lang="zh-TW" altLang="en-US" smtClean="0"/>
-              <a:t>2022/10/11</a:t>
+              <a:t>2022/10/16</a:t>
             </a:fld>
             <a:endParaRPr lang="zh-TW" altLang="en-US"/>
           </a:p>
@@ -909,7 +911,7 @@
           <a:p>
             <a:fld id="{E46B9D2B-9891-4D92-9283-023BB0FF54C4}" type="datetime1">
               <a:rPr lang="zh-TW" altLang="en-US" smtClean="0"/>
-              <a:t>2022/10/11</a:t>
+              <a:t>2022/10/16</a:t>
             </a:fld>
             <a:endParaRPr lang="zh-TW" altLang="en-US"/>
           </a:p>
@@ -1117,7 +1119,7 @@
           <a:p>
             <a:fld id="{230E20DC-7B58-4905-8980-5A93E4D9048A}" type="datetime1">
               <a:rPr lang="zh-TW" altLang="en-US" smtClean="0"/>
-              <a:t>2022/10/11</a:t>
+              <a:t>2022/10/16</a:t>
             </a:fld>
             <a:endParaRPr lang="zh-TW" altLang="en-US"/>
           </a:p>
@@ -1315,7 +1317,7 @@
           <a:p>
             <a:fld id="{BE220A8E-562A-488D-A780-3AED0F21CC6A}" type="datetime1">
               <a:rPr lang="zh-TW" altLang="en-US" smtClean="0"/>
-              <a:t>2022/10/11</a:t>
+              <a:t>2022/10/16</a:t>
             </a:fld>
             <a:endParaRPr lang="zh-TW" altLang="en-US"/>
           </a:p>
@@ -1590,7 +1592,7 @@
           <a:p>
             <a:fld id="{9D1CD631-7C26-40A1-BBB6-FF5F3E4D9E20}" type="datetime1">
               <a:rPr lang="zh-TW" altLang="en-US" smtClean="0"/>
-              <a:t>2022/10/11</a:t>
+              <a:t>2022/10/16</a:t>
             </a:fld>
             <a:endParaRPr lang="zh-TW" altLang="en-US"/>
           </a:p>
@@ -1855,7 +1857,7 @@
           <a:p>
             <a:fld id="{B5802F35-92BF-4248-940B-330F4F4C6145}" type="datetime1">
               <a:rPr lang="zh-TW" altLang="en-US" smtClean="0"/>
-              <a:t>2022/10/11</a:t>
+              <a:t>2022/10/16</a:t>
             </a:fld>
             <a:endParaRPr lang="zh-TW" altLang="en-US"/>
           </a:p>
@@ -2267,7 +2269,7 @@
           <a:p>
             <a:fld id="{A36A4676-23C3-4142-A21A-9AD4DEFEC5FB}" type="datetime1">
               <a:rPr lang="zh-TW" altLang="en-US" smtClean="0"/>
-              <a:t>2022/10/11</a:t>
+              <a:t>2022/10/16</a:t>
             </a:fld>
             <a:endParaRPr lang="zh-TW" altLang="en-US"/>
           </a:p>
@@ -2408,7 +2410,7 @@
           <a:p>
             <a:fld id="{88D075AF-6E1A-4087-AEDC-34E7B45771EF}" type="datetime1">
               <a:rPr lang="zh-TW" altLang="en-US" smtClean="0"/>
-              <a:t>2022/10/11</a:t>
+              <a:t>2022/10/16</a:t>
             </a:fld>
             <a:endParaRPr lang="zh-TW" altLang="en-US"/>
           </a:p>
@@ -2521,7 +2523,7 @@
           <a:p>
             <a:fld id="{37A93EFB-A673-4061-8913-D67BC63DBEA4}" type="datetime1">
               <a:rPr lang="zh-TW" altLang="en-US" smtClean="0"/>
-              <a:t>2022/10/11</a:t>
+              <a:t>2022/10/16</a:t>
             </a:fld>
             <a:endParaRPr lang="zh-TW" altLang="en-US"/>
           </a:p>
@@ -2817,7 +2819,7 @@
           <a:p>
             <a:fld id="{30C44284-2AA1-45EB-A1F7-78CCFC665AE8}" type="datetime1">
               <a:rPr lang="zh-TW" altLang="en-US" smtClean="0"/>
-              <a:t>2022/10/11</a:t>
+              <a:t>2022/10/16</a:t>
             </a:fld>
             <a:endParaRPr lang="zh-TW" altLang="en-US"/>
           </a:p>
@@ -3105,7 +3107,7 @@
           <a:p>
             <a:fld id="{06D23DE0-8AC8-43F4-8DB7-46CE1472C344}" type="datetime1">
               <a:rPr lang="zh-TW" altLang="en-US" smtClean="0"/>
-              <a:t>2022/10/11</a:t>
+              <a:t>2022/10/16</a:t>
             </a:fld>
             <a:endParaRPr lang="zh-TW" altLang="en-US"/>
           </a:p>
@@ -3346,7 +3348,7 @@
           <a:p>
             <a:fld id="{425C50C4-666D-4D6D-AE33-56CB198A2004}" type="datetime1">
               <a:rPr lang="zh-TW" altLang="en-US" smtClean="0"/>
-              <a:t>2022/10/11</a:t>
+              <a:t>2022/10/16</a:t>
             </a:fld>
             <a:endParaRPr lang="zh-TW" altLang="en-US"/>
           </a:p>
@@ -4497,6 +4499,16 @@
         </p:nvPicPr>
         <p:blipFill>
           <a:blip r:embed="rId3">
+            <a:clrChange>
+              <a:clrFrom>
+                <a:srgbClr val="FFFFFF"/>
+              </a:clrFrom>
+              <a:clrTo>
+                <a:srgbClr val="FFFFFF">
+                  <a:alpha val="0"/>
+                </a:srgbClr>
+              </a:clrTo>
+            </a:clrChange>
             <a:extLst>
               <a:ext uri="{28A0092B-C50C-407E-A947-70E740481C1C}">
                 <a14:useLocalDpi xmlns:a14="http://schemas.microsoft.com/office/drawing/2010/main" val="0"/>
@@ -6093,6 +6105,16 @@
           </p:nvPicPr>
           <p:blipFill>
             <a:blip r:embed="rId3">
+              <a:clrChange>
+                <a:clrFrom>
+                  <a:srgbClr val="FFFFFF"/>
+                </a:clrFrom>
+                <a:clrTo>
+                  <a:srgbClr val="FFFFFF">
+                    <a:alpha val="0"/>
+                  </a:srgbClr>
+                </a:clrTo>
+              </a:clrChange>
               <a:extLst>
                 <a:ext uri="{28A0092B-C50C-407E-A947-70E740481C1C}">
                   <a14:useLocalDpi xmlns:a14="http://schemas.microsoft.com/office/drawing/2010/main" val="0"/>
@@ -8031,6 +8053,16 @@
         </p:nvPicPr>
         <p:blipFill>
           <a:blip r:embed="rId3">
+            <a:clrChange>
+              <a:clrFrom>
+                <a:srgbClr val="FFFFFF"/>
+              </a:clrFrom>
+              <a:clrTo>
+                <a:srgbClr val="FFFFFF">
+                  <a:alpha val="0"/>
+                </a:srgbClr>
+              </a:clrTo>
+            </a:clrChange>
             <a:extLst>
               <a:ext uri="{28A0092B-C50C-407E-A947-70E740481C1C}">
                 <a14:useLocalDpi xmlns:a14="http://schemas.microsoft.com/office/drawing/2010/main" val="0"/>
@@ -8067,6 +8099,16 @@
         </p:nvPicPr>
         <p:blipFill>
           <a:blip r:embed="rId4">
+            <a:clrChange>
+              <a:clrFrom>
+                <a:srgbClr val="FFFFFF"/>
+              </a:clrFrom>
+              <a:clrTo>
+                <a:srgbClr val="FFFFFF">
+                  <a:alpha val="0"/>
+                </a:srgbClr>
+              </a:clrTo>
+            </a:clrChange>
             <a:extLst>
               <a:ext uri="{28A0092B-C50C-407E-A947-70E740481C1C}">
                 <a14:useLocalDpi xmlns:a14="http://schemas.microsoft.com/office/drawing/2010/main" val="0"/>
@@ -8322,7 +8364,7 @@
         <p:spPr>
           <a:xfrm>
             <a:off x="838203" y="359429"/>
-            <a:ext cx="8278639" cy="698776"/>
+            <a:ext cx="8594032" cy="698776"/>
           </a:xfrm>
           <a:prstGeom prst="rect">
             <a:avLst/>
@@ -8362,7 +8404,7 @@
                 <a:latin typeface="Times New Roman" panose="02020603050405020304" pitchFamily="18" charset="0"/>
                 <a:cs typeface="Times New Roman" panose="02020603050405020304" pitchFamily="18" charset="0"/>
               </a:rPr>
-              <a:t>Experimental Results - Mapping</a:t>
+              <a:t>Experimental Results - Curve Fitting - Image A</a:t>
             </a:r>
           </a:p>
         </p:txBody>
@@ -8390,258 +8432,325 @@
           <a:p>
             <a:fld id="{87B71CD7-7F58-4993-8193-E254A51C09DA}" type="slidenum">
               <a:rPr lang="zh-TW" altLang="en-US" smtClean="0"/>
+              <a:pPr/>
               <a:t>14</a:t>
             </a:fld>
             <a:endParaRPr lang="zh-TW" altLang="en-US"/>
           </a:p>
         </p:txBody>
       </p:sp>
-      <p:pic>
-        <p:nvPicPr>
-          <p:cNvPr id="20" name="圖片 19">
-            <a:extLst>
-              <a:ext uri="{FF2B5EF4-FFF2-40B4-BE49-F238E27FC236}">
-                <a16:creationId xmlns:a16="http://schemas.microsoft.com/office/drawing/2014/main" id="{25C5DA3A-DFD5-4EAC-978A-65094F21971D}"/>
-              </a:ext>
-            </a:extLst>
-          </p:cNvPr>
-          <p:cNvPicPr>
-            <a:picLocks noChangeAspect="1"/>
-          </p:cNvPicPr>
+      <p:grpSp>
+        <p:nvGrpSpPr>
+          <p:cNvPr id="7" name="群組 6">
+            <a:extLst>
+              <a:ext uri="{FF2B5EF4-FFF2-40B4-BE49-F238E27FC236}">
+                <a16:creationId xmlns:a16="http://schemas.microsoft.com/office/drawing/2014/main" id="{BBB32E8C-B282-41A4-8E86-0D5CA6540A5B}"/>
+              </a:ext>
+            </a:extLst>
+          </p:cNvPr>
+          <p:cNvGrpSpPr/>
           <p:nvPr/>
-        </p:nvPicPr>
-        <p:blipFill>
-          <a:blip r:embed="rId3">
-            <a:extLst>
-              <a:ext uri="{28A0092B-C50C-407E-A947-70E740481C1C}">
-                <a14:useLocalDpi xmlns:a14="http://schemas.microsoft.com/office/drawing/2010/main" val="0"/>
-              </a:ext>
-            </a:extLst>
-          </a:blip>
-          <a:stretch>
-            <a:fillRect/>
-          </a:stretch>
-        </p:blipFill>
-        <p:spPr>
-          <a:xfrm>
-            <a:off x="1370211" y="1954309"/>
-            <a:ext cx="3941072" cy="3822200"/>
-          </a:xfrm>
-          <a:prstGeom prst="rect">
-            <a:avLst/>
-          </a:prstGeom>
-        </p:spPr>
-      </p:pic>
-      <p:sp>
-        <p:nvSpPr>
-          <p:cNvPr id="21" name="矩形 20">
-            <a:extLst>
-              <a:ext uri="{FF2B5EF4-FFF2-40B4-BE49-F238E27FC236}">
-                <a16:creationId xmlns:a16="http://schemas.microsoft.com/office/drawing/2014/main" id="{6C5BC5CB-A35B-45B6-A017-842C4340C6CE}"/>
-              </a:ext>
-            </a:extLst>
-          </p:cNvPr>
-          <p:cNvSpPr/>
+        </p:nvGrpSpPr>
+        <p:grpSpPr>
+          <a:xfrm>
+            <a:off x="1370210" y="1052653"/>
+            <a:ext cx="9451580" cy="2700000"/>
+            <a:chOff x="1191305" y="1052653"/>
+            <a:chExt cx="9451580" cy="2955804"/>
+          </a:xfrm>
+        </p:grpSpPr>
+        <p:pic>
+          <p:nvPicPr>
+            <p:cNvPr id="10" name="圖片 9">
+              <a:extLst>
+                <a:ext uri="{FF2B5EF4-FFF2-40B4-BE49-F238E27FC236}">
+                  <a16:creationId xmlns:a16="http://schemas.microsoft.com/office/drawing/2014/main" id="{2741ADF1-98E0-445F-8BCD-18C1399BAE06}"/>
+                </a:ext>
+              </a:extLst>
+            </p:cNvPr>
+            <p:cNvPicPr>
+              <a:picLocks noChangeAspect="1"/>
+            </p:cNvPicPr>
+            <p:nvPr/>
+          </p:nvPicPr>
+          <p:blipFill>
+            <a:blip r:embed="rId3">
+              <a:clrChange>
+                <a:clrFrom>
+                  <a:srgbClr val="FFFFFF"/>
+                </a:clrFrom>
+                <a:clrTo>
+                  <a:srgbClr val="FFFFFF">
+                    <a:alpha val="0"/>
+                  </a:srgbClr>
+                </a:clrTo>
+              </a:clrChange>
+              <a:extLst>
+                <a:ext uri="{28A0092B-C50C-407E-A947-70E740481C1C}">
+                  <a14:useLocalDpi xmlns:a14="http://schemas.microsoft.com/office/drawing/2010/main" val="0"/>
+                </a:ext>
+              </a:extLst>
+            </a:blip>
+            <a:stretch>
+              <a:fillRect/>
+            </a:stretch>
+          </p:blipFill>
+          <p:spPr>
+            <a:xfrm>
+              <a:off x="1191305" y="1052653"/>
+              <a:ext cx="3941072" cy="2955804"/>
+            </a:xfrm>
+            <a:prstGeom prst="rect">
+              <a:avLst/>
+            </a:prstGeom>
+          </p:spPr>
+        </p:pic>
+        <p:pic>
+          <p:nvPicPr>
+            <p:cNvPr id="11" name="圖片 10">
+              <a:extLst>
+                <a:ext uri="{FF2B5EF4-FFF2-40B4-BE49-F238E27FC236}">
+                  <a16:creationId xmlns:a16="http://schemas.microsoft.com/office/drawing/2014/main" id="{481FF737-2CDE-44A1-9CE6-FEB10E2BC4B9}"/>
+                </a:ext>
+              </a:extLst>
+            </p:cNvPr>
+            <p:cNvPicPr>
+              <a:picLocks noChangeAspect="1"/>
+            </p:cNvPicPr>
+            <p:nvPr/>
+          </p:nvPicPr>
+          <p:blipFill>
+            <a:blip r:embed="rId4">
+              <a:clrChange>
+                <a:clrFrom>
+                  <a:srgbClr val="FFFFFF"/>
+                </a:clrFrom>
+                <a:clrTo>
+                  <a:srgbClr val="FFFFFF">
+                    <a:alpha val="0"/>
+                  </a:srgbClr>
+                </a:clrTo>
+              </a:clrChange>
+              <a:extLst>
+                <a:ext uri="{28A0092B-C50C-407E-A947-70E740481C1C}">
+                  <a14:useLocalDpi xmlns:a14="http://schemas.microsoft.com/office/drawing/2010/main" val="0"/>
+                </a:ext>
+              </a:extLst>
+            </a:blip>
+            <a:stretch>
+              <a:fillRect/>
+            </a:stretch>
+          </p:blipFill>
+          <p:spPr>
+            <a:xfrm>
+              <a:off x="6701813" y="1052653"/>
+              <a:ext cx="3941072" cy="2955804"/>
+            </a:xfrm>
+            <a:prstGeom prst="rect">
+              <a:avLst/>
+            </a:prstGeom>
+          </p:spPr>
+        </p:pic>
+        <p:sp>
+          <p:nvSpPr>
+            <p:cNvPr id="12" name="箭號: 向右 11">
+              <a:extLst>
+                <a:ext uri="{FF2B5EF4-FFF2-40B4-BE49-F238E27FC236}">
+                  <a16:creationId xmlns:a16="http://schemas.microsoft.com/office/drawing/2014/main" id="{1DE2FB48-AFF4-4E94-A43D-4E0DC1015A44}"/>
+                </a:ext>
+              </a:extLst>
+            </p:cNvPr>
+            <p:cNvSpPr/>
+            <p:nvPr/>
+          </p:nvSpPr>
+          <p:spPr>
+            <a:xfrm>
+              <a:off x="5549346" y="2282076"/>
+              <a:ext cx="735496" cy="496957"/>
+            </a:xfrm>
+            <a:prstGeom prst="rightArrow">
+              <a:avLst/>
+            </a:prstGeom>
+          </p:spPr>
+          <p:style>
+            <a:lnRef idx="2">
+              <a:schemeClr val="dk1">
+                <a:shade val="50000"/>
+              </a:schemeClr>
+            </a:lnRef>
+            <a:fillRef idx="1">
+              <a:schemeClr val="dk1"/>
+            </a:fillRef>
+            <a:effectRef idx="0">
+              <a:schemeClr val="dk1"/>
+            </a:effectRef>
+            <a:fontRef idx="minor">
+              <a:schemeClr val="lt1"/>
+            </a:fontRef>
+          </p:style>
+          <p:txBody>
+            <a:bodyPr rtlCol="0" anchor="ctr"/>
+            <a:lstStyle/>
+            <a:p>
+              <a:pPr algn="ctr"/>
+              <a:endParaRPr lang="zh-TW" altLang="en-US"/>
+            </a:p>
+          </p:txBody>
+        </p:sp>
+      </p:grpSp>
+      <p:grpSp>
+        <p:nvGrpSpPr>
+          <p:cNvPr id="8" name="群組 7">
+            <a:extLst>
+              <a:ext uri="{FF2B5EF4-FFF2-40B4-BE49-F238E27FC236}">
+                <a16:creationId xmlns:a16="http://schemas.microsoft.com/office/drawing/2014/main" id="{23F2B013-169C-469C-8663-D23BAFD338D5}"/>
+              </a:ext>
+            </a:extLst>
+          </p:cNvPr>
+          <p:cNvGrpSpPr/>
           <p:nvPr/>
-        </p:nvSpPr>
-        <p:spPr>
-          <a:xfrm>
-            <a:off x="2387601" y="1571277"/>
-            <a:ext cx="1906291" cy="461665"/>
-          </a:xfrm>
-          <a:prstGeom prst="rect">
-            <a:avLst/>
-          </a:prstGeom>
-        </p:spPr>
-        <p:txBody>
-          <a:bodyPr wrap="none" anchor="ctr">
-            <a:spAutoFit/>
-          </a:bodyPr>
-          <a:lstStyle/>
-          <a:p>
-            <a:r>
-              <a:rPr lang="en-US" altLang="zh-TW" sz="2400" b="1" dirty="0">
-                <a:effectLst/>
-                <a:latin typeface="微軟正黑體" panose="020B0604030504040204" pitchFamily="34" charset="-120"/>
-                <a:ea typeface="微軟正黑體" panose="020B0604030504040204" pitchFamily="34" charset="-120"/>
-              </a:rPr>
-              <a:t>T2 image-A</a:t>
-            </a:r>
-          </a:p>
-        </p:txBody>
-      </p:sp>
-      <p:sp>
-        <p:nvSpPr>
-          <p:cNvPr id="22" name="矩形 21">
-            <a:extLst>
-              <a:ext uri="{FF2B5EF4-FFF2-40B4-BE49-F238E27FC236}">
-                <a16:creationId xmlns:a16="http://schemas.microsoft.com/office/drawing/2014/main" id="{9085C7FB-0DFC-4DCD-B026-13939952B2D7}"/>
-              </a:ext>
-            </a:extLst>
-          </p:cNvPr>
-          <p:cNvSpPr/>
-          <p:nvPr/>
-        </p:nvSpPr>
-        <p:spPr>
-          <a:xfrm>
-            <a:off x="8199474" y="1563400"/>
-            <a:ext cx="1303562" cy="461665"/>
-          </a:xfrm>
-          <a:prstGeom prst="rect">
-            <a:avLst/>
-          </a:prstGeom>
-        </p:spPr>
-        <p:txBody>
-          <a:bodyPr wrap="none" anchor="ctr">
-            <a:spAutoFit/>
-          </a:bodyPr>
-          <a:lstStyle/>
-          <a:p>
-            <a:r>
-              <a:rPr lang="en-US" altLang="zh-TW" sz="2400" b="1" dirty="0">
-                <a:effectLst/>
-                <a:latin typeface="微軟正黑體" panose="020B0604030504040204" pitchFamily="34" charset="-120"/>
-                <a:ea typeface="微軟正黑體" panose="020B0604030504040204" pitchFamily="34" charset="-120"/>
-              </a:rPr>
-              <a:t>T2 </a:t>
-            </a:r>
-            <a:r>
-              <a:rPr lang="en-US" altLang="zh-TW" sz="2400" b="1" dirty="0">
-                <a:latin typeface="微軟正黑體" panose="020B0604030504040204" pitchFamily="34" charset="-120"/>
-                <a:ea typeface="微軟正黑體" panose="020B0604030504040204" pitchFamily="34" charset="-120"/>
-              </a:rPr>
-              <a:t>Map</a:t>
-            </a:r>
-            <a:endParaRPr lang="en-US" altLang="zh-TW" sz="2400" b="1" dirty="0">
-              <a:effectLst/>
-              <a:latin typeface="微軟正黑體" panose="020B0604030504040204" pitchFamily="34" charset="-120"/>
-              <a:ea typeface="微軟正黑體" panose="020B0604030504040204" pitchFamily="34" charset="-120"/>
-            </a:endParaRPr>
-          </a:p>
-        </p:txBody>
-      </p:sp>
-      <p:pic>
-        <p:nvPicPr>
-          <p:cNvPr id="23" name="圖片 22">
-            <a:extLst>
-              <a:ext uri="{FF2B5EF4-FFF2-40B4-BE49-F238E27FC236}">
-                <a16:creationId xmlns:a16="http://schemas.microsoft.com/office/drawing/2014/main" id="{0796A129-9A57-45E2-8620-72DA87D513B3}"/>
-              </a:ext>
-            </a:extLst>
-          </p:cNvPr>
-          <p:cNvPicPr>
-            <a:picLocks noChangeAspect="1"/>
-          </p:cNvPicPr>
-          <p:nvPr/>
-        </p:nvPicPr>
-        <p:blipFill>
-          <a:blip r:embed="rId4">
-            <a:extLst>
-              <a:ext uri="{28A0092B-C50C-407E-A947-70E740481C1C}">
-                <a14:useLocalDpi xmlns:a14="http://schemas.microsoft.com/office/drawing/2010/main" val="0"/>
-              </a:ext>
-            </a:extLst>
-          </a:blip>
-          <a:stretch>
-            <a:fillRect/>
-          </a:stretch>
-        </p:blipFill>
-        <p:spPr>
-          <a:xfrm>
-            <a:off x="6880719" y="1954309"/>
-            <a:ext cx="3941072" cy="3822200"/>
-          </a:xfrm>
-          <a:prstGeom prst="rect">
-            <a:avLst/>
-          </a:prstGeom>
-        </p:spPr>
-      </p:pic>
-      <p:sp>
-        <p:nvSpPr>
-          <p:cNvPr id="24" name="箭號: 向右 23">
-            <a:extLst>
-              <a:ext uri="{FF2B5EF4-FFF2-40B4-BE49-F238E27FC236}">
-                <a16:creationId xmlns:a16="http://schemas.microsoft.com/office/drawing/2014/main" id="{0E6886C0-3F7F-4E88-8A01-B08A848AC259}"/>
-              </a:ext>
-            </a:extLst>
-          </p:cNvPr>
-          <p:cNvSpPr/>
-          <p:nvPr/>
-        </p:nvSpPr>
-        <p:spPr>
-          <a:xfrm>
-            <a:off x="5728252" y="3616930"/>
-            <a:ext cx="735496" cy="496957"/>
-          </a:xfrm>
-          <a:prstGeom prst="rightArrow">
-            <a:avLst/>
-          </a:prstGeom>
-        </p:spPr>
-        <p:style>
-          <a:lnRef idx="2">
-            <a:schemeClr val="dk1">
-              <a:shade val="50000"/>
-            </a:schemeClr>
-          </a:lnRef>
-          <a:fillRef idx="1">
-            <a:schemeClr val="dk1"/>
-          </a:fillRef>
-          <a:effectRef idx="0">
-            <a:schemeClr val="dk1"/>
-          </a:effectRef>
-          <a:fontRef idx="minor">
-            <a:schemeClr val="lt1"/>
-          </a:fontRef>
-        </p:style>
-        <p:txBody>
-          <a:bodyPr rtlCol="0" anchor="ctr"/>
-          <a:lstStyle/>
-          <a:p>
-            <a:pPr algn="ctr"/>
-            <a:endParaRPr lang="zh-TW" altLang="en-US"/>
-          </a:p>
-        </p:txBody>
-      </p:sp>
-      <p:sp>
-        <p:nvSpPr>
-          <p:cNvPr id="25" name="文字方塊 24">
-            <a:extLst>
-              <a:ext uri="{FF2B5EF4-FFF2-40B4-BE49-F238E27FC236}">
-                <a16:creationId xmlns:a16="http://schemas.microsoft.com/office/drawing/2014/main" id="{3F96E452-E6F9-42F2-AD9B-9D0C6EDDD493}"/>
-              </a:ext>
-            </a:extLst>
-          </p:cNvPr>
-          <p:cNvSpPr txBox="1"/>
-          <p:nvPr/>
-        </p:nvSpPr>
-        <p:spPr>
-          <a:xfrm>
-            <a:off x="5554319" y="3028890"/>
-            <a:ext cx="1123122" cy="400110"/>
-          </a:xfrm>
-          <a:prstGeom prst="rect">
-            <a:avLst/>
-          </a:prstGeom>
-          <a:noFill/>
-        </p:spPr>
-        <p:txBody>
-          <a:bodyPr wrap="square" rtlCol="0">
-            <a:spAutoFit/>
-          </a:bodyPr>
-          <a:lstStyle/>
-          <a:p>
-            <a:r>
-              <a:rPr lang="en-US" altLang="zh-TW" sz="2000" dirty="0"/>
-              <a:t>Mapping</a:t>
-            </a:r>
-            <a:endParaRPr lang="zh-TW" altLang="en-US" sz="2000" dirty="0"/>
-          </a:p>
-        </p:txBody>
-      </p:sp>
+        </p:nvGrpSpPr>
+        <p:grpSpPr>
+          <a:xfrm>
+            <a:off x="1370210" y="3823999"/>
+            <a:ext cx="9451580" cy="2700000"/>
+            <a:chOff x="1191305" y="3883633"/>
+            <a:chExt cx="9451580" cy="2955804"/>
+          </a:xfrm>
+        </p:grpSpPr>
+        <p:pic>
+          <p:nvPicPr>
+            <p:cNvPr id="14" name="圖片 13">
+              <a:extLst>
+                <a:ext uri="{FF2B5EF4-FFF2-40B4-BE49-F238E27FC236}">
+                  <a16:creationId xmlns:a16="http://schemas.microsoft.com/office/drawing/2014/main" id="{356CEAE3-D037-41AD-8EF8-623CE0845465}"/>
+                </a:ext>
+              </a:extLst>
+            </p:cNvPr>
+            <p:cNvPicPr>
+              <a:picLocks noChangeAspect="1"/>
+            </p:cNvPicPr>
+            <p:nvPr/>
+          </p:nvPicPr>
+          <p:blipFill>
+            <a:blip r:embed="rId5">
+              <a:extLst>
+                <a:ext uri="{28A0092B-C50C-407E-A947-70E740481C1C}">
+                  <a14:useLocalDpi xmlns:a14="http://schemas.microsoft.com/office/drawing/2010/main" val="0"/>
+                </a:ext>
+              </a:extLst>
+            </a:blip>
+            <a:stretch>
+              <a:fillRect/>
+            </a:stretch>
+          </p:blipFill>
+          <p:spPr>
+            <a:xfrm>
+              <a:off x="1191305" y="3883633"/>
+              <a:ext cx="3941072" cy="2955804"/>
+            </a:xfrm>
+            <a:prstGeom prst="rect">
+              <a:avLst/>
+            </a:prstGeom>
+          </p:spPr>
+        </p:pic>
+        <p:pic>
+          <p:nvPicPr>
+            <p:cNvPr id="15" name="圖片 14">
+              <a:extLst>
+                <a:ext uri="{FF2B5EF4-FFF2-40B4-BE49-F238E27FC236}">
+                  <a16:creationId xmlns:a16="http://schemas.microsoft.com/office/drawing/2014/main" id="{FD8284A0-5087-42BA-8E0D-2C01DD226AFE}"/>
+                </a:ext>
+              </a:extLst>
+            </p:cNvPr>
+            <p:cNvPicPr>
+              <a:picLocks noChangeAspect="1"/>
+            </p:cNvPicPr>
+            <p:nvPr/>
+          </p:nvPicPr>
+          <p:blipFill>
+            <a:blip r:embed="rId6">
+              <a:clrChange>
+                <a:clrFrom>
+                  <a:srgbClr val="FFFFFF"/>
+                </a:clrFrom>
+                <a:clrTo>
+                  <a:srgbClr val="FFFFFF">
+                    <a:alpha val="0"/>
+                  </a:srgbClr>
+                </a:clrTo>
+              </a:clrChange>
+              <a:extLst>
+                <a:ext uri="{28A0092B-C50C-407E-A947-70E740481C1C}">
+                  <a14:useLocalDpi xmlns:a14="http://schemas.microsoft.com/office/drawing/2010/main" val="0"/>
+                </a:ext>
+              </a:extLst>
+            </a:blip>
+            <a:stretch>
+              <a:fillRect/>
+            </a:stretch>
+          </p:blipFill>
+          <p:spPr>
+            <a:xfrm>
+              <a:off x="6701813" y="3883633"/>
+              <a:ext cx="3941072" cy="2955804"/>
+            </a:xfrm>
+            <a:prstGeom prst="rect">
+              <a:avLst/>
+            </a:prstGeom>
+          </p:spPr>
+        </p:pic>
+        <p:sp>
+          <p:nvSpPr>
+            <p:cNvPr id="16" name="箭號: 向右 15">
+              <a:extLst>
+                <a:ext uri="{FF2B5EF4-FFF2-40B4-BE49-F238E27FC236}">
+                  <a16:creationId xmlns:a16="http://schemas.microsoft.com/office/drawing/2014/main" id="{776B3A1E-A4E9-413F-842D-B43CE3E4C1D8}"/>
+                </a:ext>
+              </a:extLst>
+            </p:cNvPr>
+            <p:cNvSpPr/>
+            <p:nvPr/>
+          </p:nvSpPr>
+          <p:spPr>
+            <a:xfrm>
+              <a:off x="5549346" y="5113056"/>
+              <a:ext cx="735496" cy="496957"/>
+            </a:xfrm>
+            <a:prstGeom prst="rightArrow">
+              <a:avLst/>
+            </a:prstGeom>
+          </p:spPr>
+          <p:style>
+            <a:lnRef idx="2">
+              <a:schemeClr val="dk1">
+                <a:shade val="50000"/>
+              </a:schemeClr>
+            </a:lnRef>
+            <a:fillRef idx="1">
+              <a:schemeClr val="dk1"/>
+            </a:fillRef>
+            <a:effectRef idx="0">
+              <a:schemeClr val="dk1"/>
+            </a:effectRef>
+            <a:fontRef idx="minor">
+              <a:schemeClr val="lt1"/>
+            </a:fontRef>
+          </p:style>
+          <p:txBody>
+            <a:bodyPr rtlCol="0" anchor="ctr"/>
+            <a:lstStyle/>
+            <a:p>
+              <a:pPr algn="ctr"/>
+              <a:endParaRPr lang="zh-TW" altLang="en-US"/>
+            </a:p>
+          </p:txBody>
+        </p:sp>
+      </p:grpSp>
     </p:spTree>
     <p:extLst>
       <p:ext uri="{BB962C8B-B14F-4D97-AF65-F5344CB8AC3E}">
-        <p14:creationId xmlns:p14="http://schemas.microsoft.com/office/powerpoint/2010/main" val="2271792005"/>
+        <p14:creationId xmlns:p14="http://schemas.microsoft.com/office/powerpoint/2010/main" val="1621693428"/>
       </p:ext>
     </p:extLst>
   </p:cSld>
@@ -8827,7 +8936,7 @@
         <p:spPr>
           <a:xfrm>
             <a:off x="838203" y="359429"/>
-            <a:ext cx="8278639" cy="698776"/>
+            <a:ext cx="8544336" cy="698776"/>
           </a:xfrm>
           <a:prstGeom prst="rect">
             <a:avLst/>
@@ -8867,7 +8976,7 @@
                 <a:latin typeface="Times New Roman" panose="02020603050405020304" pitchFamily="18" charset="0"/>
                 <a:cs typeface="Times New Roman" panose="02020603050405020304" pitchFamily="18" charset="0"/>
               </a:rPr>
-              <a:t>Experimental Results - Mapping</a:t>
+              <a:t>Experimental Results - Curve Fitting - Image B</a:t>
             </a:r>
           </a:p>
         </p:txBody>
@@ -8895,7 +9004,589 @@
           <a:p>
             <a:fld id="{87B71CD7-7F58-4993-8193-E254A51C09DA}" type="slidenum">
               <a:rPr lang="zh-TW" altLang="en-US" smtClean="0"/>
+              <a:pPr/>
               <a:t>15</a:t>
+            </a:fld>
+            <a:endParaRPr lang="zh-TW" altLang="en-US"/>
+          </a:p>
+        </p:txBody>
+      </p:sp>
+      <p:grpSp>
+        <p:nvGrpSpPr>
+          <p:cNvPr id="13" name="群組 12">
+            <a:extLst>
+              <a:ext uri="{FF2B5EF4-FFF2-40B4-BE49-F238E27FC236}">
+                <a16:creationId xmlns:a16="http://schemas.microsoft.com/office/drawing/2014/main" id="{92754051-99C2-484E-843E-6AE930B06A0A}"/>
+              </a:ext>
+            </a:extLst>
+          </p:cNvPr>
+          <p:cNvGrpSpPr/>
+          <p:nvPr/>
+        </p:nvGrpSpPr>
+        <p:grpSpPr>
+          <a:xfrm>
+            <a:off x="1370210" y="1135177"/>
+            <a:ext cx="9451580" cy="2700000"/>
+            <a:chOff x="1370211" y="2387507"/>
+            <a:chExt cx="9451580" cy="2955804"/>
+          </a:xfrm>
+        </p:grpSpPr>
+        <p:pic>
+          <p:nvPicPr>
+            <p:cNvPr id="22" name="圖片 21">
+              <a:extLst>
+                <a:ext uri="{FF2B5EF4-FFF2-40B4-BE49-F238E27FC236}">
+                  <a16:creationId xmlns:a16="http://schemas.microsoft.com/office/drawing/2014/main" id="{3D101EF5-298A-4888-8BE9-B58B34588BC1}"/>
+                </a:ext>
+              </a:extLst>
+            </p:cNvPr>
+            <p:cNvPicPr>
+              <a:picLocks noChangeAspect="1"/>
+            </p:cNvPicPr>
+            <p:nvPr/>
+          </p:nvPicPr>
+          <p:blipFill>
+            <a:blip r:embed="rId3">
+              <a:clrChange>
+                <a:clrFrom>
+                  <a:srgbClr val="FFFFFF"/>
+                </a:clrFrom>
+                <a:clrTo>
+                  <a:srgbClr val="FFFFFF">
+                    <a:alpha val="0"/>
+                  </a:srgbClr>
+                </a:clrTo>
+              </a:clrChange>
+              <a:extLst>
+                <a:ext uri="{28A0092B-C50C-407E-A947-70E740481C1C}">
+                  <a14:useLocalDpi xmlns:a14="http://schemas.microsoft.com/office/drawing/2010/main" val="0"/>
+                </a:ext>
+              </a:extLst>
+            </a:blip>
+            <a:stretch>
+              <a:fillRect/>
+            </a:stretch>
+          </p:blipFill>
+          <p:spPr>
+            <a:xfrm>
+              <a:off x="1370211" y="2387507"/>
+              <a:ext cx="3941072" cy="2955804"/>
+            </a:xfrm>
+            <a:prstGeom prst="rect">
+              <a:avLst/>
+            </a:prstGeom>
+          </p:spPr>
+        </p:pic>
+        <p:pic>
+          <p:nvPicPr>
+            <p:cNvPr id="25" name="圖片 24">
+              <a:extLst>
+                <a:ext uri="{FF2B5EF4-FFF2-40B4-BE49-F238E27FC236}">
+                  <a16:creationId xmlns:a16="http://schemas.microsoft.com/office/drawing/2014/main" id="{A5D56EA5-45F4-4EA5-8897-2E6A0942E055}"/>
+                </a:ext>
+              </a:extLst>
+            </p:cNvPr>
+            <p:cNvPicPr>
+              <a:picLocks noChangeAspect="1"/>
+            </p:cNvPicPr>
+            <p:nvPr/>
+          </p:nvPicPr>
+          <p:blipFill>
+            <a:blip r:embed="rId4">
+              <a:clrChange>
+                <a:clrFrom>
+                  <a:srgbClr val="FFFFFF"/>
+                </a:clrFrom>
+                <a:clrTo>
+                  <a:srgbClr val="FFFFFF">
+                    <a:alpha val="0"/>
+                  </a:srgbClr>
+                </a:clrTo>
+              </a:clrChange>
+              <a:extLst>
+                <a:ext uri="{28A0092B-C50C-407E-A947-70E740481C1C}">
+                  <a14:useLocalDpi xmlns:a14="http://schemas.microsoft.com/office/drawing/2010/main" val="0"/>
+                </a:ext>
+              </a:extLst>
+            </a:blip>
+            <a:stretch>
+              <a:fillRect/>
+            </a:stretch>
+          </p:blipFill>
+          <p:spPr>
+            <a:xfrm>
+              <a:off x="6880719" y="2387507"/>
+              <a:ext cx="3941072" cy="2955804"/>
+            </a:xfrm>
+            <a:prstGeom prst="rect">
+              <a:avLst/>
+            </a:prstGeom>
+          </p:spPr>
+        </p:pic>
+        <p:sp>
+          <p:nvSpPr>
+            <p:cNvPr id="26" name="箭號: 向右 25">
+              <a:extLst>
+                <a:ext uri="{FF2B5EF4-FFF2-40B4-BE49-F238E27FC236}">
+                  <a16:creationId xmlns:a16="http://schemas.microsoft.com/office/drawing/2014/main" id="{F81448E4-A3C4-4935-BB79-821EC706D014}"/>
+                </a:ext>
+              </a:extLst>
+            </p:cNvPr>
+            <p:cNvSpPr/>
+            <p:nvPr/>
+          </p:nvSpPr>
+          <p:spPr>
+            <a:xfrm>
+              <a:off x="5728252" y="3616930"/>
+              <a:ext cx="735496" cy="496957"/>
+            </a:xfrm>
+            <a:prstGeom prst="rightArrow">
+              <a:avLst/>
+            </a:prstGeom>
+          </p:spPr>
+          <p:style>
+            <a:lnRef idx="2">
+              <a:schemeClr val="dk1">
+                <a:shade val="50000"/>
+              </a:schemeClr>
+            </a:lnRef>
+            <a:fillRef idx="1">
+              <a:schemeClr val="dk1"/>
+            </a:fillRef>
+            <a:effectRef idx="0">
+              <a:schemeClr val="dk1"/>
+            </a:effectRef>
+            <a:fontRef idx="minor">
+              <a:schemeClr val="lt1"/>
+            </a:fontRef>
+          </p:style>
+          <p:txBody>
+            <a:bodyPr rtlCol="0" anchor="ctr"/>
+            <a:lstStyle/>
+            <a:p>
+              <a:pPr algn="ctr"/>
+              <a:endParaRPr lang="zh-TW" altLang="en-US"/>
+            </a:p>
+          </p:txBody>
+        </p:sp>
+      </p:grpSp>
+      <p:grpSp>
+        <p:nvGrpSpPr>
+          <p:cNvPr id="17" name="群組 16">
+            <a:extLst>
+              <a:ext uri="{FF2B5EF4-FFF2-40B4-BE49-F238E27FC236}">
+                <a16:creationId xmlns:a16="http://schemas.microsoft.com/office/drawing/2014/main" id="{75FBEB34-4C35-434E-8A94-10896119B321}"/>
+              </a:ext>
+            </a:extLst>
+          </p:cNvPr>
+          <p:cNvGrpSpPr/>
+          <p:nvPr/>
+        </p:nvGrpSpPr>
+        <p:grpSpPr>
+          <a:xfrm>
+            <a:off x="1370210" y="3828683"/>
+            <a:ext cx="9451580" cy="2700000"/>
+            <a:chOff x="1370211" y="3391360"/>
+            <a:chExt cx="9451580" cy="2955804"/>
+          </a:xfrm>
+        </p:grpSpPr>
+        <p:pic>
+          <p:nvPicPr>
+            <p:cNvPr id="27" name="圖片 26">
+              <a:extLst>
+                <a:ext uri="{FF2B5EF4-FFF2-40B4-BE49-F238E27FC236}">
+                  <a16:creationId xmlns:a16="http://schemas.microsoft.com/office/drawing/2014/main" id="{FEF9A14B-BA6E-425D-8389-806B247DFA30}"/>
+                </a:ext>
+              </a:extLst>
+            </p:cNvPr>
+            <p:cNvPicPr>
+              <a:picLocks noChangeAspect="1"/>
+            </p:cNvPicPr>
+            <p:nvPr/>
+          </p:nvPicPr>
+          <p:blipFill>
+            <a:blip r:embed="rId5">
+              <a:clrChange>
+                <a:clrFrom>
+                  <a:srgbClr val="FFFFFF"/>
+                </a:clrFrom>
+                <a:clrTo>
+                  <a:srgbClr val="FFFFFF">
+                    <a:alpha val="0"/>
+                  </a:srgbClr>
+                </a:clrTo>
+              </a:clrChange>
+              <a:extLst>
+                <a:ext uri="{28A0092B-C50C-407E-A947-70E740481C1C}">
+                  <a14:useLocalDpi xmlns:a14="http://schemas.microsoft.com/office/drawing/2010/main" val="0"/>
+                </a:ext>
+              </a:extLst>
+            </a:blip>
+            <a:stretch>
+              <a:fillRect/>
+            </a:stretch>
+          </p:blipFill>
+          <p:spPr>
+            <a:xfrm>
+              <a:off x="1370211" y="3391360"/>
+              <a:ext cx="3941072" cy="2955804"/>
+            </a:xfrm>
+            <a:prstGeom prst="rect">
+              <a:avLst/>
+            </a:prstGeom>
+          </p:spPr>
+        </p:pic>
+        <p:pic>
+          <p:nvPicPr>
+            <p:cNvPr id="28" name="圖片 27">
+              <a:extLst>
+                <a:ext uri="{FF2B5EF4-FFF2-40B4-BE49-F238E27FC236}">
+                  <a16:creationId xmlns:a16="http://schemas.microsoft.com/office/drawing/2014/main" id="{09C4DD16-B855-4508-A1F0-55208B28FE2F}"/>
+                </a:ext>
+              </a:extLst>
+            </p:cNvPr>
+            <p:cNvPicPr>
+              <a:picLocks noChangeAspect="1"/>
+            </p:cNvPicPr>
+            <p:nvPr/>
+          </p:nvPicPr>
+          <p:blipFill>
+            <a:blip r:embed="rId6">
+              <a:clrChange>
+                <a:clrFrom>
+                  <a:srgbClr val="FFFFFF"/>
+                </a:clrFrom>
+                <a:clrTo>
+                  <a:srgbClr val="FFFFFF">
+                    <a:alpha val="0"/>
+                  </a:srgbClr>
+                </a:clrTo>
+              </a:clrChange>
+              <a:extLst>
+                <a:ext uri="{28A0092B-C50C-407E-A947-70E740481C1C}">
+                  <a14:useLocalDpi xmlns:a14="http://schemas.microsoft.com/office/drawing/2010/main" val="0"/>
+                </a:ext>
+              </a:extLst>
+            </a:blip>
+            <a:stretch>
+              <a:fillRect/>
+            </a:stretch>
+          </p:blipFill>
+          <p:spPr>
+            <a:xfrm>
+              <a:off x="6880719" y="3391360"/>
+              <a:ext cx="3941072" cy="2955804"/>
+            </a:xfrm>
+            <a:prstGeom prst="rect">
+              <a:avLst/>
+            </a:prstGeom>
+          </p:spPr>
+        </p:pic>
+        <p:sp>
+          <p:nvSpPr>
+            <p:cNvPr id="29" name="箭號: 向右 28">
+              <a:extLst>
+                <a:ext uri="{FF2B5EF4-FFF2-40B4-BE49-F238E27FC236}">
+                  <a16:creationId xmlns:a16="http://schemas.microsoft.com/office/drawing/2014/main" id="{B5A807CF-E5A1-4AB2-9D06-EFDD514323ED}"/>
+                </a:ext>
+              </a:extLst>
+            </p:cNvPr>
+            <p:cNvSpPr/>
+            <p:nvPr/>
+          </p:nvSpPr>
+          <p:spPr>
+            <a:xfrm>
+              <a:off x="5728252" y="4620783"/>
+              <a:ext cx="735496" cy="496957"/>
+            </a:xfrm>
+            <a:prstGeom prst="rightArrow">
+              <a:avLst/>
+            </a:prstGeom>
+          </p:spPr>
+          <p:style>
+            <a:lnRef idx="2">
+              <a:schemeClr val="dk1">
+                <a:shade val="50000"/>
+              </a:schemeClr>
+            </a:lnRef>
+            <a:fillRef idx="1">
+              <a:schemeClr val="dk1"/>
+            </a:fillRef>
+            <a:effectRef idx="0">
+              <a:schemeClr val="dk1"/>
+            </a:effectRef>
+            <a:fontRef idx="minor">
+              <a:schemeClr val="lt1"/>
+            </a:fontRef>
+          </p:style>
+          <p:txBody>
+            <a:bodyPr rtlCol="0" anchor="ctr"/>
+            <a:lstStyle/>
+            <a:p>
+              <a:pPr algn="ctr"/>
+              <a:endParaRPr lang="zh-TW" altLang="en-US"/>
+            </a:p>
+          </p:txBody>
+        </p:sp>
+      </p:grpSp>
+    </p:spTree>
+    <p:extLst>
+      <p:ext uri="{BB962C8B-B14F-4D97-AF65-F5344CB8AC3E}">
+        <p14:creationId xmlns:p14="http://schemas.microsoft.com/office/powerpoint/2010/main" val="790027578"/>
+      </p:ext>
+    </p:extLst>
+  </p:cSld>
+  <p:clrMapOvr>
+    <a:masterClrMapping/>
+  </p:clrMapOvr>
+</p:sld>
+</file>
+
+<file path=ppt/slides/slide17.xml><?xml version="1.0" encoding="utf-8"?>
+<p:sld xmlns:a="http://schemas.openxmlformats.org/drawingml/2006/main" xmlns:r="http://schemas.openxmlformats.org/officeDocument/2006/relationships" xmlns:p="http://schemas.openxmlformats.org/presentationml/2006/main">
+  <p:cSld>
+    <p:spTree>
+      <p:nvGrpSpPr>
+        <p:cNvPr id="1" name=""/>
+        <p:cNvGrpSpPr/>
+        <p:nvPr/>
+      </p:nvGrpSpPr>
+      <p:grpSpPr>
+        <a:xfrm>
+          <a:off x="0" y="0"/>
+          <a:ext cx="0" cy="0"/>
+          <a:chOff x="0" y="0"/>
+          <a:chExt cx="0" cy="0"/>
+        </a:xfrm>
+      </p:grpSpPr>
+      <p:sp>
+        <p:nvSpPr>
+          <p:cNvPr id="2" name="矩形 1">
+            <a:extLst>
+              <a:ext uri="{FF2B5EF4-FFF2-40B4-BE49-F238E27FC236}">
+                <a16:creationId xmlns:a16="http://schemas.microsoft.com/office/drawing/2014/main" id="{16CDCEF0-C13A-4DFC-B636-D7A3FE3D4AD7}"/>
+              </a:ext>
+            </a:extLst>
+          </p:cNvPr>
+          <p:cNvSpPr/>
+          <p:nvPr/>
+        </p:nvSpPr>
+        <p:spPr>
+          <a:xfrm>
+            <a:off x="0" y="0"/>
+            <a:ext cx="12192000" cy="1047600"/>
+          </a:xfrm>
+          <a:prstGeom prst="rect">
+            <a:avLst/>
+          </a:prstGeom>
+          <a:solidFill>
+            <a:schemeClr val="bg2">
+              <a:lumMod val="75000"/>
+            </a:schemeClr>
+          </a:solidFill>
+          <a:ln>
+            <a:noFill/>
+          </a:ln>
+        </p:spPr>
+        <p:style>
+          <a:lnRef idx="2">
+            <a:schemeClr val="dk1">
+              <a:shade val="50000"/>
+            </a:schemeClr>
+          </a:lnRef>
+          <a:fillRef idx="1">
+            <a:schemeClr val="dk1"/>
+          </a:fillRef>
+          <a:effectRef idx="0">
+            <a:schemeClr val="dk1"/>
+          </a:effectRef>
+          <a:fontRef idx="minor">
+            <a:schemeClr val="lt1"/>
+          </a:fontRef>
+        </p:style>
+        <p:txBody>
+          <a:bodyPr rtlCol="0" anchor="ctr"/>
+          <a:lstStyle/>
+          <a:p>
+            <a:pPr algn="ctr"/>
+            <a:endParaRPr lang="zh-TW" altLang="en-US"/>
+          </a:p>
+        </p:txBody>
+      </p:sp>
+      <p:pic>
+        <p:nvPicPr>
+          <p:cNvPr id="3" name="圖片 2">
+            <a:extLst>
+              <a:ext uri="{FF2B5EF4-FFF2-40B4-BE49-F238E27FC236}">
+                <a16:creationId xmlns:a16="http://schemas.microsoft.com/office/drawing/2014/main" id="{6BB9BF00-6B01-40E7-A72C-BB5409EABA50}"/>
+              </a:ext>
+            </a:extLst>
+          </p:cNvPr>
+          <p:cNvPicPr>
+            <a:picLocks noChangeAspect="1"/>
+          </p:cNvPicPr>
+          <p:nvPr/>
+        </p:nvPicPr>
+        <p:blipFill>
+          <a:blip r:embed="rId2" cstate="hqprint">
+            <a:extLst>
+              <a:ext uri="{28A0092B-C50C-407E-A947-70E740481C1C}">
+                <a14:useLocalDpi xmlns:a14="http://schemas.microsoft.com/office/drawing/2010/main" val="0"/>
+              </a:ext>
+            </a:extLst>
+          </a:blip>
+          <a:stretch>
+            <a:fillRect/>
+          </a:stretch>
+        </p:blipFill>
+        <p:spPr>
+          <a:xfrm>
+            <a:off x="9690756" y="6302326"/>
+            <a:ext cx="2580675" cy="555677"/>
+          </a:xfrm>
+          <a:prstGeom prst="rect">
+            <a:avLst/>
+          </a:prstGeom>
+        </p:spPr>
+      </p:pic>
+      <p:sp>
+        <p:nvSpPr>
+          <p:cNvPr id="4" name="標題 5">
+            <a:extLst>
+              <a:ext uri="{FF2B5EF4-FFF2-40B4-BE49-F238E27FC236}">
+                <a16:creationId xmlns:a16="http://schemas.microsoft.com/office/drawing/2014/main" id="{8F422EBC-CBA5-4FB9-A52E-D98EEABCC8FE}"/>
+              </a:ext>
+            </a:extLst>
+          </p:cNvPr>
+          <p:cNvSpPr txBox="1">
+            <a:spLocks/>
+          </p:cNvSpPr>
+          <p:nvPr/>
+        </p:nvSpPr>
+        <p:spPr>
+          <a:xfrm>
+            <a:off x="838199" y="483084"/>
+            <a:ext cx="3899264" cy="554345"/>
+          </a:xfrm>
+          <a:prstGeom prst="rect">
+            <a:avLst/>
+          </a:prstGeom>
+        </p:spPr>
+        <p:txBody>
+          <a:bodyPr/>
+          <a:lstStyle>
+            <a:lvl1pPr algn="l" defTabSz="914400" rtl="0" eaLnBrk="1" latinLnBrk="0" hangingPunct="1">
+              <a:lnSpc>
+                <a:spcPct val="90000"/>
+              </a:lnSpc>
+              <a:spcBef>
+                <a:spcPct val="0"/>
+              </a:spcBef>
+              <a:buNone/>
+              <a:defRPr sz="4400" kern="1200">
+                <a:solidFill>
+                  <a:schemeClr val="tx1"/>
+                </a:solidFill>
+                <a:latin typeface="+mj-lt"/>
+                <a:ea typeface="+mj-ea"/>
+                <a:cs typeface="+mj-cs"/>
+              </a:defRPr>
+            </a:lvl1pPr>
+          </a:lstStyle>
+          <a:p>
+            <a:endParaRPr lang="zh-TW" altLang="en-US" sz="3200" dirty="0">
+              <a:latin typeface="Times New Roman" panose="02020603050405020304" pitchFamily="18" charset="0"/>
+              <a:cs typeface="Times New Roman" panose="02020603050405020304" pitchFamily="18" charset="0"/>
+            </a:endParaRPr>
+          </a:p>
+        </p:txBody>
+      </p:sp>
+      <p:sp>
+        <p:nvSpPr>
+          <p:cNvPr id="6" name="標題 3">
+            <a:extLst>
+              <a:ext uri="{FF2B5EF4-FFF2-40B4-BE49-F238E27FC236}">
+                <a16:creationId xmlns:a16="http://schemas.microsoft.com/office/drawing/2014/main" id="{33FBAD3F-8A6B-4F1B-8CCD-C5823AEC1D0F}"/>
+              </a:ext>
+            </a:extLst>
+          </p:cNvPr>
+          <p:cNvSpPr txBox="1">
+            <a:spLocks/>
+          </p:cNvSpPr>
+          <p:nvPr/>
+        </p:nvSpPr>
+        <p:spPr>
+          <a:xfrm>
+            <a:off x="838203" y="359429"/>
+            <a:ext cx="8278639" cy="698776"/>
+          </a:xfrm>
+          <a:prstGeom prst="rect">
+            <a:avLst/>
+          </a:prstGeom>
+        </p:spPr>
+        <p:txBody>
+          <a:bodyPr/>
+          <a:lstStyle>
+            <a:lvl1pPr algn="l" defTabSz="914400" rtl="0" eaLnBrk="1" latinLnBrk="0" hangingPunct="1">
+              <a:lnSpc>
+                <a:spcPct val="90000"/>
+              </a:lnSpc>
+              <a:spcBef>
+                <a:spcPct val="0"/>
+              </a:spcBef>
+              <a:buNone/>
+              <a:defRPr sz="4400" kern="1200">
+                <a:solidFill>
+                  <a:schemeClr val="tx1"/>
+                </a:solidFill>
+                <a:latin typeface="+mj-lt"/>
+                <a:ea typeface="+mj-ea"/>
+                <a:cs typeface="+mj-cs"/>
+              </a:defRPr>
+            </a:lvl1pPr>
+          </a:lstStyle>
+          <a:p>
+            <a:pPr>
+              <a:buFont typeface="Wingdings" panose="05000000000000000000" pitchFamily="2" charset="2"/>
+              <a:buChar char="l"/>
+            </a:pPr>
+            <a:r>
+              <a:rPr lang="en-US" altLang="zh-TW" sz="3200" dirty="0">
+                <a:solidFill>
+                  <a:schemeClr val="bg2"/>
+                </a:solidFill>
+                <a:latin typeface="Times New Roman" panose="02020603050405020304" pitchFamily="18" charset="0"/>
+                <a:cs typeface="Times New Roman" panose="02020603050405020304" pitchFamily="18" charset="0"/>
+              </a:rPr>
+              <a:t>Experimental Results - Mapping</a:t>
+            </a:r>
+          </a:p>
+        </p:txBody>
+      </p:sp>
+      <p:sp>
+        <p:nvSpPr>
+          <p:cNvPr id="9" name="投影片編號版面配置區 8">
+            <a:extLst>
+              <a:ext uri="{FF2B5EF4-FFF2-40B4-BE49-F238E27FC236}">
+                <a16:creationId xmlns:a16="http://schemas.microsoft.com/office/drawing/2014/main" id="{EB7039E3-E51D-44BC-A4A1-B753D31282FC}"/>
+              </a:ext>
+            </a:extLst>
+          </p:cNvPr>
+          <p:cNvSpPr>
+            <a:spLocks noGrp="1"/>
+          </p:cNvSpPr>
+          <p:nvPr>
+            <p:ph type="sldNum" sz="quarter" idx="12"/>
+          </p:nvPr>
+        </p:nvSpPr>
+        <p:spPr/>
+        <p:txBody>
+          <a:bodyPr/>
+          <a:lstStyle/>
+          <a:p>
+            <a:fld id="{87B71CD7-7F58-4993-8193-E254A51C09DA}" type="slidenum">
+              <a:rPr lang="zh-TW" altLang="en-US" smtClean="0"/>
+              <a:t>16</a:t>
             </a:fld>
             <a:endParaRPr lang="zh-TW" altLang="en-US"/>
           </a:p>
@@ -8917,6 +9608,16 @@
         </p:nvPicPr>
         <p:blipFill>
           <a:blip r:embed="rId3">
+            <a:clrChange>
+              <a:clrFrom>
+                <a:srgbClr val="FFFFFF"/>
+              </a:clrFrom>
+              <a:clrTo>
+                <a:srgbClr val="FFFFFF">
+                  <a:alpha val="0"/>
+                </a:srgbClr>
+              </a:clrTo>
+            </a:clrChange>
             <a:extLst>
               <a:ext uri="{28A0092B-C50C-407E-A947-70E740481C1C}">
                 <a14:useLocalDpi xmlns:a14="http://schemas.microsoft.com/office/drawing/2010/main" val="0"/>
@@ -8952,7 +9653,7 @@
         <p:spPr>
           <a:xfrm>
             <a:off x="2387601" y="1571277"/>
-            <a:ext cx="1883849" cy="461665"/>
+            <a:ext cx="1906291" cy="461665"/>
           </a:xfrm>
           <a:prstGeom prst="rect">
             <a:avLst/>
@@ -8970,7 +9671,7 @@
                 <a:latin typeface="微軟正黑體" panose="020B0604030504040204" pitchFamily="34" charset="-120"/>
                 <a:ea typeface="微軟正黑體" panose="020B0604030504040204" pitchFamily="34" charset="-120"/>
               </a:rPr>
-              <a:t>T2 image-B</a:t>
+              <a:t>T2 image-A</a:t>
             </a:r>
           </a:p>
         </p:txBody>
@@ -9039,22 +9740,31 @@
           </p:cNvPicPr>
           <p:nvPr/>
         </p:nvPicPr>
-        <p:blipFill>
+        <p:blipFill rotWithShape="1">
           <a:blip r:embed="rId4">
+            <a:clrChange>
+              <a:clrFrom>
+                <a:srgbClr val="FFFFFF"/>
+              </a:clrFrom>
+              <a:clrTo>
+                <a:srgbClr val="FFFFFF">
+                  <a:alpha val="0"/>
+                </a:srgbClr>
+              </a:clrTo>
+            </a:clrChange>
             <a:extLst>
               <a:ext uri="{28A0092B-C50C-407E-A947-70E740481C1C}">
                 <a14:useLocalDpi xmlns:a14="http://schemas.microsoft.com/office/drawing/2010/main" val="0"/>
               </a:ext>
             </a:extLst>
           </a:blip>
-          <a:stretch>
-            <a:fillRect/>
-          </a:stretch>
+          <a:srcRect l="12880" t="7849" r="13603" b="2607"/>
+          <a:stretch/>
         </p:blipFill>
         <p:spPr>
           <a:xfrm>
-            <a:off x="6880719" y="1954309"/>
-            <a:ext cx="3941072" cy="3822200"/>
+            <a:off x="6850871" y="1898930"/>
+            <a:ext cx="4305298" cy="3932955"/>
           </a:xfrm>
           <a:prstGeom prst="rect">
             <a:avLst/>
@@ -9146,6 +9856,530 @@
     </p:spTree>
     <p:extLst>
       <p:ext uri="{BB962C8B-B14F-4D97-AF65-F5344CB8AC3E}">
+        <p14:creationId xmlns:p14="http://schemas.microsoft.com/office/powerpoint/2010/main" val="2271792005"/>
+      </p:ext>
+    </p:extLst>
+  </p:cSld>
+  <p:clrMapOvr>
+    <a:masterClrMapping/>
+  </p:clrMapOvr>
+</p:sld>
+</file>
+
+<file path=ppt/slides/slide18.xml><?xml version="1.0" encoding="utf-8"?>
+<p:sld xmlns:a="http://schemas.openxmlformats.org/drawingml/2006/main" xmlns:r="http://schemas.openxmlformats.org/officeDocument/2006/relationships" xmlns:p="http://schemas.openxmlformats.org/presentationml/2006/main">
+  <p:cSld>
+    <p:spTree>
+      <p:nvGrpSpPr>
+        <p:cNvPr id="1" name=""/>
+        <p:cNvGrpSpPr/>
+        <p:nvPr/>
+      </p:nvGrpSpPr>
+      <p:grpSpPr>
+        <a:xfrm>
+          <a:off x="0" y="0"/>
+          <a:ext cx="0" cy="0"/>
+          <a:chOff x="0" y="0"/>
+          <a:chExt cx="0" cy="0"/>
+        </a:xfrm>
+      </p:grpSpPr>
+      <p:sp>
+        <p:nvSpPr>
+          <p:cNvPr id="2" name="矩形 1">
+            <a:extLst>
+              <a:ext uri="{FF2B5EF4-FFF2-40B4-BE49-F238E27FC236}">
+                <a16:creationId xmlns:a16="http://schemas.microsoft.com/office/drawing/2014/main" id="{16CDCEF0-C13A-4DFC-B636-D7A3FE3D4AD7}"/>
+              </a:ext>
+            </a:extLst>
+          </p:cNvPr>
+          <p:cNvSpPr/>
+          <p:nvPr/>
+        </p:nvSpPr>
+        <p:spPr>
+          <a:xfrm>
+            <a:off x="0" y="0"/>
+            <a:ext cx="12192000" cy="1047600"/>
+          </a:xfrm>
+          <a:prstGeom prst="rect">
+            <a:avLst/>
+          </a:prstGeom>
+          <a:solidFill>
+            <a:schemeClr val="bg2">
+              <a:lumMod val="75000"/>
+            </a:schemeClr>
+          </a:solidFill>
+          <a:ln>
+            <a:noFill/>
+          </a:ln>
+        </p:spPr>
+        <p:style>
+          <a:lnRef idx="2">
+            <a:schemeClr val="dk1">
+              <a:shade val="50000"/>
+            </a:schemeClr>
+          </a:lnRef>
+          <a:fillRef idx="1">
+            <a:schemeClr val="dk1"/>
+          </a:fillRef>
+          <a:effectRef idx="0">
+            <a:schemeClr val="dk1"/>
+          </a:effectRef>
+          <a:fontRef idx="minor">
+            <a:schemeClr val="lt1"/>
+          </a:fontRef>
+        </p:style>
+        <p:txBody>
+          <a:bodyPr rtlCol="0" anchor="ctr"/>
+          <a:lstStyle/>
+          <a:p>
+            <a:pPr algn="ctr"/>
+            <a:endParaRPr lang="zh-TW" altLang="en-US"/>
+          </a:p>
+        </p:txBody>
+      </p:sp>
+      <p:pic>
+        <p:nvPicPr>
+          <p:cNvPr id="3" name="圖片 2">
+            <a:extLst>
+              <a:ext uri="{FF2B5EF4-FFF2-40B4-BE49-F238E27FC236}">
+                <a16:creationId xmlns:a16="http://schemas.microsoft.com/office/drawing/2014/main" id="{6BB9BF00-6B01-40E7-A72C-BB5409EABA50}"/>
+              </a:ext>
+            </a:extLst>
+          </p:cNvPr>
+          <p:cNvPicPr>
+            <a:picLocks noChangeAspect="1"/>
+          </p:cNvPicPr>
+          <p:nvPr/>
+        </p:nvPicPr>
+        <p:blipFill>
+          <a:blip r:embed="rId2" cstate="hqprint">
+            <a:extLst>
+              <a:ext uri="{28A0092B-C50C-407E-A947-70E740481C1C}">
+                <a14:useLocalDpi xmlns:a14="http://schemas.microsoft.com/office/drawing/2010/main" val="0"/>
+              </a:ext>
+            </a:extLst>
+          </a:blip>
+          <a:stretch>
+            <a:fillRect/>
+          </a:stretch>
+        </p:blipFill>
+        <p:spPr>
+          <a:xfrm>
+            <a:off x="9690756" y="6302326"/>
+            <a:ext cx="2580675" cy="555677"/>
+          </a:xfrm>
+          <a:prstGeom prst="rect">
+            <a:avLst/>
+          </a:prstGeom>
+        </p:spPr>
+      </p:pic>
+      <p:sp>
+        <p:nvSpPr>
+          <p:cNvPr id="4" name="標題 5">
+            <a:extLst>
+              <a:ext uri="{FF2B5EF4-FFF2-40B4-BE49-F238E27FC236}">
+                <a16:creationId xmlns:a16="http://schemas.microsoft.com/office/drawing/2014/main" id="{8F422EBC-CBA5-4FB9-A52E-D98EEABCC8FE}"/>
+              </a:ext>
+            </a:extLst>
+          </p:cNvPr>
+          <p:cNvSpPr txBox="1">
+            <a:spLocks/>
+          </p:cNvSpPr>
+          <p:nvPr/>
+        </p:nvSpPr>
+        <p:spPr>
+          <a:xfrm>
+            <a:off x="838199" y="483084"/>
+            <a:ext cx="3899264" cy="554345"/>
+          </a:xfrm>
+          <a:prstGeom prst="rect">
+            <a:avLst/>
+          </a:prstGeom>
+        </p:spPr>
+        <p:txBody>
+          <a:bodyPr/>
+          <a:lstStyle>
+            <a:lvl1pPr algn="l" defTabSz="914400" rtl="0" eaLnBrk="1" latinLnBrk="0" hangingPunct="1">
+              <a:lnSpc>
+                <a:spcPct val="90000"/>
+              </a:lnSpc>
+              <a:spcBef>
+                <a:spcPct val="0"/>
+              </a:spcBef>
+              <a:buNone/>
+              <a:defRPr sz="4400" kern="1200">
+                <a:solidFill>
+                  <a:schemeClr val="tx1"/>
+                </a:solidFill>
+                <a:latin typeface="+mj-lt"/>
+                <a:ea typeface="+mj-ea"/>
+                <a:cs typeface="+mj-cs"/>
+              </a:defRPr>
+            </a:lvl1pPr>
+          </a:lstStyle>
+          <a:p>
+            <a:endParaRPr lang="zh-TW" altLang="en-US" sz="3200" dirty="0">
+              <a:latin typeface="Times New Roman" panose="02020603050405020304" pitchFamily="18" charset="0"/>
+              <a:cs typeface="Times New Roman" panose="02020603050405020304" pitchFamily="18" charset="0"/>
+            </a:endParaRPr>
+          </a:p>
+        </p:txBody>
+      </p:sp>
+      <p:sp>
+        <p:nvSpPr>
+          <p:cNvPr id="6" name="標題 3">
+            <a:extLst>
+              <a:ext uri="{FF2B5EF4-FFF2-40B4-BE49-F238E27FC236}">
+                <a16:creationId xmlns:a16="http://schemas.microsoft.com/office/drawing/2014/main" id="{33FBAD3F-8A6B-4F1B-8CCD-C5823AEC1D0F}"/>
+              </a:ext>
+            </a:extLst>
+          </p:cNvPr>
+          <p:cNvSpPr txBox="1">
+            <a:spLocks/>
+          </p:cNvSpPr>
+          <p:nvPr/>
+        </p:nvSpPr>
+        <p:spPr>
+          <a:xfrm>
+            <a:off x="838203" y="359429"/>
+            <a:ext cx="8278639" cy="698776"/>
+          </a:xfrm>
+          <a:prstGeom prst="rect">
+            <a:avLst/>
+          </a:prstGeom>
+        </p:spPr>
+        <p:txBody>
+          <a:bodyPr/>
+          <a:lstStyle>
+            <a:lvl1pPr algn="l" defTabSz="914400" rtl="0" eaLnBrk="1" latinLnBrk="0" hangingPunct="1">
+              <a:lnSpc>
+                <a:spcPct val="90000"/>
+              </a:lnSpc>
+              <a:spcBef>
+                <a:spcPct val="0"/>
+              </a:spcBef>
+              <a:buNone/>
+              <a:defRPr sz="4400" kern="1200">
+                <a:solidFill>
+                  <a:schemeClr val="tx1"/>
+                </a:solidFill>
+                <a:latin typeface="+mj-lt"/>
+                <a:ea typeface="+mj-ea"/>
+                <a:cs typeface="+mj-cs"/>
+              </a:defRPr>
+            </a:lvl1pPr>
+          </a:lstStyle>
+          <a:p>
+            <a:pPr>
+              <a:buFont typeface="Wingdings" panose="05000000000000000000" pitchFamily="2" charset="2"/>
+              <a:buChar char="l"/>
+            </a:pPr>
+            <a:r>
+              <a:rPr lang="en-US" altLang="zh-TW" sz="3200" dirty="0">
+                <a:solidFill>
+                  <a:schemeClr val="bg2"/>
+                </a:solidFill>
+                <a:latin typeface="Times New Roman" panose="02020603050405020304" pitchFamily="18" charset="0"/>
+                <a:cs typeface="Times New Roman" panose="02020603050405020304" pitchFamily="18" charset="0"/>
+              </a:rPr>
+              <a:t>Experimental Results - Mapping</a:t>
+            </a:r>
+          </a:p>
+        </p:txBody>
+      </p:sp>
+      <p:sp>
+        <p:nvSpPr>
+          <p:cNvPr id="9" name="投影片編號版面配置區 8">
+            <a:extLst>
+              <a:ext uri="{FF2B5EF4-FFF2-40B4-BE49-F238E27FC236}">
+                <a16:creationId xmlns:a16="http://schemas.microsoft.com/office/drawing/2014/main" id="{EB7039E3-E51D-44BC-A4A1-B753D31282FC}"/>
+              </a:ext>
+            </a:extLst>
+          </p:cNvPr>
+          <p:cNvSpPr>
+            <a:spLocks noGrp="1"/>
+          </p:cNvSpPr>
+          <p:nvPr>
+            <p:ph type="sldNum" sz="quarter" idx="12"/>
+          </p:nvPr>
+        </p:nvSpPr>
+        <p:spPr/>
+        <p:txBody>
+          <a:bodyPr/>
+          <a:lstStyle/>
+          <a:p>
+            <a:fld id="{87B71CD7-7F58-4993-8193-E254A51C09DA}" type="slidenum">
+              <a:rPr lang="zh-TW" altLang="en-US" smtClean="0"/>
+              <a:t>17</a:t>
+            </a:fld>
+            <a:endParaRPr lang="zh-TW" altLang="en-US"/>
+          </a:p>
+        </p:txBody>
+      </p:sp>
+      <p:pic>
+        <p:nvPicPr>
+          <p:cNvPr id="20" name="圖片 19">
+            <a:extLst>
+              <a:ext uri="{FF2B5EF4-FFF2-40B4-BE49-F238E27FC236}">
+                <a16:creationId xmlns:a16="http://schemas.microsoft.com/office/drawing/2014/main" id="{25C5DA3A-DFD5-4EAC-978A-65094F21971D}"/>
+              </a:ext>
+            </a:extLst>
+          </p:cNvPr>
+          <p:cNvPicPr>
+            <a:picLocks noChangeAspect="1"/>
+          </p:cNvPicPr>
+          <p:nvPr/>
+        </p:nvPicPr>
+        <p:blipFill>
+          <a:blip r:embed="rId3">
+            <a:clrChange>
+              <a:clrFrom>
+                <a:srgbClr val="FFFFFF"/>
+              </a:clrFrom>
+              <a:clrTo>
+                <a:srgbClr val="FFFFFF">
+                  <a:alpha val="0"/>
+                </a:srgbClr>
+              </a:clrTo>
+            </a:clrChange>
+            <a:extLst>
+              <a:ext uri="{28A0092B-C50C-407E-A947-70E740481C1C}">
+                <a14:useLocalDpi xmlns:a14="http://schemas.microsoft.com/office/drawing/2010/main" val="0"/>
+              </a:ext>
+            </a:extLst>
+          </a:blip>
+          <a:stretch>
+            <a:fillRect/>
+          </a:stretch>
+        </p:blipFill>
+        <p:spPr>
+          <a:xfrm>
+            <a:off x="1370211" y="1954309"/>
+            <a:ext cx="3941072" cy="3822200"/>
+          </a:xfrm>
+          <a:prstGeom prst="rect">
+            <a:avLst/>
+          </a:prstGeom>
+        </p:spPr>
+      </p:pic>
+      <p:sp>
+        <p:nvSpPr>
+          <p:cNvPr id="21" name="矩形 20">
+            <a:extLst>
+              <a:ext uri="{FF2B5EF4-FFF2-40B4-BE49-F238E27FC236}">
+                <a16:creationId xmlns:a16="http://schemas.microsoft.com/office/drawing/2014/main" id="{6C5BC5CB-A35B-45B6-A017-842C4340C6CE}"/>
+              </a:ext>
+            </a:extLst>
+          </p:cNvPr>
+          <p:cNvSpPr/>
+          <p:nvPr/>
+        </p:nvSpPr>
+        <p:spPr>
+          <a:xfrm>
+            <a:off x="2387601" y="1571277"/>
+            <a:ext cx="1883849" cy="461665"/>
+          </a:xfrm>
+          <a:prstGeom prst="rect">
+            <a:avLst/>
+          </a:prstGeom>
+        </p:spPr>
+        <p:txBody>
+          <a:bodyPr wrap="none" anchor="ctr">
+            <a:spAutoFit/>
+          </a:bodyPr>
+          <a:lstStyle/>
+          <a:p>
+            <a:r>
+              <a:rPr lang="en-US" altLang="zh-TW" sz="2400" b="1" dirty="0">
+                <a:effectLst/>
+                <a:latin typeface="微軟正黑體" panose="020B0604030504040204" pitchFamily="34" charset="-120"/>
+                <a:ea typeface="微軟正黑體" panose="020B0604030504040204" pitchFamily="34" charset="-120"/>
+              </a:rPr>
+              <a:t>T2 image-B</a:t>
+            </a:r>
+          </a:p>
+        </p:txBody>
+      </p:sp>
+      <p:sp>
+        <p:nvSpPr>
+          <p:cNvPr id="22" name="矩形 21">
+            <a:extLst>
+              <a:ext uri="{FF2B5EF4-FFF2-40B4-BE49-F238E27FC236}">
+                <a16:creationId xmlns:a16="http://schemas.microsoft.com/office/drawing/2014/main" id="{9085C7FB-0DFC-4DCD-B026-13939952B2D7}"/>
+              </a:ext>
+            </a:extLst>
+          </p:cNvPr>
+          <p:cNvSpPr/>
+          <p:nvPr/>
+        </p:nvSpPr>
+        <p:spPr>
+          <a:xfrm>
+            <a:off x="8199474" y="1563400"/>
+            <a:ext cx="1303562" cy="461665"/>
+          </a:xfrm>
+          <a:prstGeom prst="rect">
+            <a:avLst/>
+          </a:prstGeom>
+        </p:spPr>
+        <p:txBody>
+          <a:bodyPr wrap="none" anchor="ctr">
+            <a:spAutoFit/>
+          </a:bodyPr>
+          <a:lstStyle/>
+          <a:p>
+            <a:r>
+              <a:rPr lang="en-US" altLang="zh-TW" sz="2400" b="1" dirty="0">
+                <a:effectLst/>
+                <a:latin typeface="微軟正黑體" panose="020B0604030504040204" pitchFamily="34" charset="-120"/>
+                <a:ea typeface="微軟正黑體" panose="020B0604030504040204" pitchFamily="34" charset="-120"/>
+              </a:rPr>
+              <a:t>T2 </a:t>
+            </a:r>
+            <a:r>
+              <a:rPr lang="en-US" altLang="zh-TW" sz="2400" b="1" dirty="0">
+                <a:latin typeface="微軟正黑體" panose="020B0604030504040204" pitchFamily="34" charset="-120"/>
+                <a:ea typeface="微軟正黑體" panose="020B0604030504040204" pitchFamily="34" charset="-120"/>
+              </a:rPr>
+              <a:t>Map</a:t>
+            </a:r>
+            <a:endParaRPr lang="en-US" altLang="zh-TW" sz="2400" b="1" dirty="0">
+              <a:effectLst/>
+              <a:latin typeface="微軟正黑體" panose="020B0604030504040204" pitchFamily="34" charset="-120"/>
+              <a:ea typeface="微軟正黑體" panose="020B0604030504040204" pitchFamily="34" charset="-120"/>
+            </a:endParaRPr>
+          </a:p>
+        </p:txBody>
+      </p:sp>
+      <p:pic>
+        <p:nvPicPr>
+          <p:cNvPr id="23" name="圖片 22">
+            <a:extLst>
+              <a:ext uri="{FF2B5EF4-FFF2-40B4-BE49-F238E27FC236}">
+                <a16:creationId xmlns:a16="http://schemas.microsoft.com/office/drawing/2014/main" id="{0796A129-9A57-45E2-8620-72DA87D513B3}"/>
+              </a:ext>
+            </a:extLst>
+          </p:cNvPr>
+          <p:cNvPicPr>
+            <a:picLocks noChangeAspect="1"/>
+          </p:cNvPicPr>
+          <p:nvPr/>
+        </p:nvPicPr>
+        <p:blipFill rotWithShape="1">
+          <a:blip r:embed="rId4">
+            <a:clrChange>
+              <a:clrFrom>
+                <a:srgbClr val="FFFFFF"/>
+              </a:clrFrom>
+              <a:clrTo>
+                <a:srgbClr val="FFFFFF">
+                  <a:alpha val="0"/>
+                </a:srgbClr>
+              </a:clrTo>
+            </a:clrChange>
+            <a:extLst>
+              <a:ext uri="{28A0092B-C50C-407E-A947-70E740481C1C}">
+                <a14:useLocalDpi xmlns:a14="http://schemas.microsoft.com/office/drawing/2010/main" val="0"/>
+              </a:ext>
+            </a:extLst>
+          </a:blip>
+          <a:srcRect l="15026" t="8678" r="13306" b="4032"/>
+          <a:stretch/>
+        </p:blipFill>
+        <p:spPr>
+          <a:xfrm>
+            <a:off x="6916230" y="1944371"/>
+            <a:ext cx="4184109" cy="3822200"/>
+          </a:xfrm>
+          <a:prstGeom prst="rect">
+            <a:avLst/>
+          </a:prstGeom>
+        </p:spPr>
+      </p:pic>
+      <p:sp>
+        <p:nvSpPr>
+          <p:cNvPr id="24" name="箭號: 向右 23">
+            <a:extLst>
+              <a:ext uri="{FF2B5EF4-FFF2-40B4-BE49-F238E27FC236}">
+                <a16:creationId xmlns:a16="http://schemas.microsoft.com/office/drawing/2014/main" id="{0E6886C0-3F7F-4E88-8A01-B08A848AC259}"/>
+              </a:ext>
+            </a:extLst>
+          </p:cNvPr>
+          <p:cNvSpPr/>
+          <p:nvPr/>
+        </p:nvSpPr>
+        <p:spPr>
+          <a:xfrm>
+            <a:off x="5728252" y="3616930"/>
+            <a:ext cx="735496" cy="496957"/>
+          </a:xfrm>
+          <a:prstGeom prst="rightArrow">
+            <a:avLst/>
+          </a:prstGeom>
+        </p:spPr>
+        <p:style>
+          <a:lnRef idx="2">
+            <a:schemeClr val="dk1">
+              <a:shade val="50000"/>
+            </a:schemeClr>
+          </a:lnRef>
+          <a:fillRef idx="1">
+            <a:schemeClr val="dk1"/>
+          </a:fillRef>
+          <a:effectRef idx="0">
+            <a:schemeClr val="dk1"/>
+          </a:effectRef>
+          <a:fontRef idx="minor">
+            <a:schemeClr val="lt1"/>
+          </a:fontRef>
+        </p:style>
+        <p:txBody>
+          <a:bodyPr rtlCol="0" anchor="ctr"/>
+          <a:lstStyle/>
+          <a:p>
+            <a:pPr algn="ctr"/>
+            <a:endParaRPr lang="zh-TW" altLang="en-US"/>
+          </a:p>
+        </p:txBody>
+      </p:sp>
+      <p:sp>
+        <p:nvSpPr>
+          <p:cNvPr id="25" name="文字方塊 24">
+            <a:extLst>
+              <a:ext uri="{FF2B5EF4-FFF2-40B4-BE49-F238E27FC236}">
+                <a16:creationId xmlns:a16="http://schemas.microsoft.com/office/drawing/2014/main" id="{3F96E452-E6F9-42F2-AD9B-9D0C6EDDD493}"/>
+              </a:ext>
+            </a:extLst>
+          </p:cNvPr>
+          <p:cNvSpPr txBox="1"/>
+          <p:nvPr/>
+        </p:nvSpPr>
+        <p:spPr>
+          <a:xfrm>
+            <a:off x="5554319" y="3028890"/>
+            <a:ext cx="1123122" cy="400110"/>
+          </a:xfrm>
+          <a:prstGeom prst="rect">
+            <a:avLst/>
+          </a:prstGeom>
+          <a:noFill/>
+        </p:spPr>
+        <p:txBody>
+          <a:bodyPr wrap="square" rtlCol="0">
+            <a:spAutoFit/>
+          </a:bodyPr>
+          <a:lstStyle/>
+          <a:p>
+            <a:r>
+              <a:rPr lang="en-US" altLang="zh-TW" sz="2000" dirty="0"/>
+              <a:t>Mapping</a:t>
+            </a:r>
+            <a:endParaRPr lang="zh-TW" altLang="en-US" sz="2000" dirty="0"/>
+          </a:p>
+        </p:txBody>
+      </p:sp>
+    </p:spTree>
+    <p:extLst>
+      <p:ext uri="{BB962C8B-B14F-4D97-AF65-F5344CB8AC3E}">
         <p14:creationId xmlns:p14="http://schemas.microsoft.com/office/powerpoint/2010/main" val="3688809059"/>
       </p:ext>
     </p:extLst>
@@ -9156,7 +10390,7 @@
 </p:sld>
 </file>
 
-<file path=ppt/slides/slide17.xml><?xml version="1.0" encoding="utf-8"?>
+<file path=ppt/slides/slide19.xml><?xml version="1.0" encoding="utf-8"?>
 <p:sld xmlns:a="http://schemas.openxmlformats.org/drawingml/2006/main" xmlns:r="http://schemas.openxmlformats.org/officeDocument/2006/relationships" xmlns:p="http://schemas.openxmlformats.org/presentationml/2006/main">
   <p:cSld>
     <p:spTree>
@@ -9443,7 +10677,7 @@
           <a:p>
             <a:fld id="{0F7416F7-7A92-427C-82AA-57A1311919BC}" type="slidenum">
               <a:rPr lang="zh-TW" altLang="en-US" smtClean="0"/>
-              <a:t>16</a:t>
+              <a:t>18</a:t>
             </a:fld>
             <a:endParaRPr lang="zh-TW" altLang="en-US"/>
           </a:p>
@@ -10391,6 +11625,16 @@
         </p:nvPicPr>
         <p:blipFill>
           <a:blip r:embed="rId3">
+            <a:clrChange>
+              <a:clrFrom>
+                <a:srgbClr val="FFFFFF"/>
+              </a:clrFrom>
+              <a:clrTo>
+                <a:srgbClr val="FFFFFF">
+                  <a:alpha val="0"/>
+                </a:srgbClr>
+              </a:clrTo>
+            </a:clrChange>
             <a:extLst>
               <a:ext uri="{28A0092B-C50C-407E-A947-70E740481C1C}">
                 <a14:useLocalDpi xmlns:a14="http://schemas.microsoft.com/office/drawing/2010/main" val="0"/>
@@ -10427,6 +11671,16 @@
         </p:nvPicPr>
         <p:blipFill>
           <a:blip r:embed="rId4">
+            <a:clrChange>
+              <a:clrFrom>
+                <a:srgbClr val="FFFFFF"/>
+              </a:clrFrom>
+              <a:clrTo>
+                <a:srgbClr val="FFFFFF">
+                  <a:alpha val="0"/>
+                </a:srgbClr>
+              </a:clrTo>
+            </a:clrChange>
             <a:extLst>
               <a:ext uri="{28A0092B-C50C-407E-A947-70E740481C1C}">
                 <a14:useLocalDpi xmlns:a14="http://schemas.microsoft.com/office/drawing/2010/main" val="0"/>
@@ -11029,6 +12283,16 @@
         </p:nvPicPr>
         <p:blipFill>
           <a:blip r:embed="rId4">
+            <a:clrChange>
+              <a:clrFrom>
+                <a:srgbClr val="FFFFFF"/>
+              </a:clrFrom>
+              <a:clrTo>
+                <a:srgbClr val="FFFFFF">
+                  <a:alpha val="0"/>
+                </a:srgbClr>
+              </a:clrTo>
+            </a:clrChange>
             <a:extLst>
               <a:ext uri="{28A0092B-C50C-407E-A947-70E740481C1C}">
                 <a14:useLocalDpi xmlns:a14="http://schemas.microsoft.com/office/drawing/2010/main" val="0"/>
@@ -11491,6 +12755,16 @@
         </p:nvPicPr>
         <p:blipFill>
           <a:blip r:embed="rId3">
+            <a:clrChange>
+              <a:clrFrom>
+                <a:srgbClr val="FFFFFF"/>
+              </a:clrFrom>
+              <a:clrTo>
+                <a:srgbClr val="FFFFFF">
+                  <a:alpha val="0"/>
+                </a:srgbClr>
+              </a:clrTo>
+            </a:clrChange>
             <a:extLst>
               <a:ext uri="{28A0092B-C50C-407E-A947-70E740481C1C}">
                 <a14:useLocalDpi xmlns:a14="http://schemas.microsoft.com/office/drawing/2010/main" val="0"/>
@@ -11599,42 +12873,6 @@
           </a:p>
         </p:txBody>
       </p:sp>
-      <p:pic>
-        <p:nvPicPr>
-          <p:cNvPr id="7" name="圖片 6">
-            <a:extLst>
-              <a:ext uri="{FF2B5EF4-FFF2-40B4-BE49-F238E27FC236}">
-                <a16:creationId xmlns:a16="http://schemas.microsoft.com/office/drawing/2014/main" id="{EDD4DA8F-4177-457F-81CA-4CE13F8634EF}"/>
-              </a:ext>
-            </a:extLst>
-          </p:cNvPr>
-          <p:cNvPicPr>
-            <a:picLocks noChangeAspect="1"/>
-          </p:cNvPicPr>
-          <p:nvPr/>
-        </p:nvPicPr>
-        <p:blipFill>
-          <a:blip r:embed="rId4">
-            <a:extLst>
-              <a:ext uri="{28A0092B-C50C-407E-A947-70E740481C1C}">
-                <a14:useLocalDpi xmlns:a14="http://schemas.microsoft.com/office/drawing/2010/main" val="0"/>
-              </a:ext>
-            </a:extLst>
-          </a:blip>
-          <a:stretch>
-            <a:fillRect/>
-          </a:stretch>
-        </p:blipFill>
-        <p:spPr>
-          <a:xfrm>
-            <a:off x="6880719" y="1954309"/>
-            <a:ext cx="3941072" cy="3822200"/>
-          </a:xfrm>
-          <a:prstGeom prst="rect">
-            <a:avLst/>
-          </a:prstGeom>
-        </p:spPr>
-      </p:pic>
       <p:sp>
         <p:nvSpPr>
           <p:cNvPr id="10" name="箭號: 向右 9">
@@ -11717,6 +12955,51 @@
           </a:p>
         </p:txBody>
       </p:sp>
+      <p:pic>
+        <p:nvPicPr>
+          <p:cNvPr id="15" name="圖片 14">
+            <a:extLst>
+              <a:ext uri="{FF2B5EF4-FFF2-40B4-BE49-F238E27FC236}">
+                <a16:creationId xmlns:a16="http://schemas.microsoft.com/office/drawing/2014/main" id="{14D0A0CD-7C7A-47C8-9DDC-E718D4FB02E3}"/>
+              </a:ext>
+            </a:extLst>
+          </p:cNvPr>
+          <p:cNvPicPr>
+            <a:picLocks noChangeAspect="1"/>
+          </p:cNvPicPr>
+          <p:nvPr/>
+        </p:nvPicPr>
+        <p:blipFill rotWithShape="1">
+          <a:blip r:embed="rId4">
+            <a:clrChange>
+              <a:clrFrom>
+                <a:srgbClr val="FFFFFF"/>
+              </a:clrFrom>
+              <a:clrTo>
+                <a:srgbClr val="FFFFFF">
+                  <a:alpha val="0"/>
+                </a:srgbClr>
+              </a:clrTo>
+            </a:clrChange>
+            <a:extLst>
+              <a:ext uri="{28A0092B-C50C-407E-A947-70E740481C1C}">
+                <a14:useLocalDpi xmlns:a14="http://schemas.microsoft.com/office/drawing/2010/main" val="0"/>
+              </a:ext>
+            </a:extLst>
+          </a:blip>
+          <a:srcRect l="12880" t="7849" r="13603" b="2607"/>
+          <a:stretch/>
+        </p:blipFill>
+        <p:spPr>
+          <a:xfrm>
+            <a:off x="6850871" y="1898930"/>
+            <a:ext cx="4305298" cy="3932955"/>
+          </a:xfrm>
+          <a:prstGeom prst="rect">
+            <a:avLst/>
+          </a:prstGeom>
+        </p:spPr>
+      </p:pic>
     </p:spTree>
     <p:extLst>
       <p:ext uri="{BB962C8B-B14F-4D97-AF65-F5344CB8AC3E}">

</xml_diff>

<commit_message>
Update ppt and pdf
</commit_message>
<xml_diff>
--- a/Spin_echo_12echo_HW1/MRI_HW1_M11107309.pptx
+++ b/Spin_echo_12echo_HW1/MRI_HW1_M11107309.pptx
@@ -215,7 +215,7 @@
           <a:p>
             <a:fld id="{824215CE-41C6-465E-9183-51FFFBBEE69D}" type="datetimeFigureOut">
               <a:rPr lang="zh-TW" altLang="en-US" smtClean="0"/>
-              <a:t>2022/10/16</a:t>
+              <a:t>2022/10/18</a:t>
             </a:fld>
             <a:endParaRPr lang="zh-TW" altLang="en-US"/>
           </a:p>
@@ -713,7 +713,7 @@
           <a:p>
             <a:fld id="{CCBF0A4F-D4AC-415A-8379-F71647B914E2}" type="datetime1">
               <a:rPr lang="zh-TW" altLang="en-US" smtClean="0"/>
-              <a:t>2022/10/16</a:t>
+              <a:t>2022/10/18</a:t>
             </a:fld>
             <a:endParaRPr lang="zh-TW" altLang="en-US"/>
           </a:p>
@@ -911,7 +911,7 @@
           <a:p>
             <a:fld id="{E46B9D2B-9891-4D92-9283-023BB0FF54C4}" type="datetime1">
               <a:rPr lang="zh-TW" altLang="en-US" smtClean="0"/>
-              <a:t>2022/10/16</a:t>
+              <a:t>2022/10/18</a:t>
             </a:fld>
             <a:endParaRPr lang="zh-TW" altLang="en-US"/>
           </a:p>
@@ -1119,7 +1119,7 @@
           <a:p>
             <a:fld id="{230E20DC-7B58-4905-8980-5A93E4D9048A}" type="datetime1">
               <a:rPr lang="zh-TW" altLang="en-US" smtClean="0"/>
-              <a:t>2022/10/16</a:t>
+              <a:t>2022/10/18</a:t>
             </a:fld>
             <a:endParaRPr lang="zh-TW" altLang="en-US"/>
           </a:p>
@@ -1317,7 +1317,7 @@
           <a:p>
             <a:fld id="{BE220A8E-562A-488D-A780-3AED0F21CC6A}" type="datetime1">
               <a:rPr lang="zh-TW" altLang="en-US" smtClean="0"/>
-              <a:t>2022/10/16</a:t>
+              <a:t>2022/10/18</a:t>
             </a:fld>
             <a:endParaRPr lang="zh-TW" altLang="en-US"/>
           </a:p>
@@ -1592,7 +1592,7 @@
           <a:p>
             <a:fld id="{9D1CD631-7C26-40A1-BBB6-FF5F3E4D9E20}" type="datetime1">
               <a:rPr lang="zh-TW" altLang="en-US" smtClean="0"/>
-              <a:t>2022/10/16</a:t>
+              <a:t>2022/10/18</a:t>
             </a:fld>
             <a:endParaRPr lang="zh-TW" altLang="en-US"/>
           </a:p>
@@ -1857,7 +1857,7 @@
           <a:p>
             <a:fld id="{B5802F35-92BF-4248-940B-330F4F4C6145}" type="datetime1">
               <a:rPr lang="zh-TW" altLang="en-US" smtClean="0"/>
-              <a:t>2022/10/16</a:t>
+              <a:t>2022/10/18</a:t>
             </a:fld>
             <a:endParaRPr lang="zh-TW" altLang="en-US"/>
           </a:p>
@@ -2269,7 +2269,7 @@
           <a:p>
             <a:fld id="{A36A4676-23C3-4142-A21A-9AD4DEFEC5FB}" type="datetime1">
               <a:rPr lang="zh-TW" altLang="en-US" smtClean="0"/>
-              <a:t>2022/10/16</a:t>
+              <a:t>2022/10/18</a:t>
             </a:fld>
             <a:endParaRPr lang="zh-TW" altLang="en-US"/>
           </a:p>
@@ -2410,7 +2410,7 @@
           <a:p>
             <a:fld id="{88D075AF-6E1A-4087-AEDC-34E7B45771EF}" type="datetime1">
               <a:rPr lang="zh-TW" altLang="en-US" smtClean="0"/>
-              <a:t>2022/10/16</a:t>
+              <a:t>2022/10/18</a:t>
             </a:fld>
             <a:endParaRPr lang="zh-TW" altLang="en-US"/>
           </a:p>
@@ -2523,7 +2523,7 @@
           <a:p>
             <a:fld id="{37A93EFB-A673-4061-8913-D67BC63DBEA4}" type="datetime1">
               <a:rPr lang="zh-TW" altLang="en-US" smtClean="0"/>
-              <a:t>2022/10/16</a:t>
+              <a:t>2022/10/18</a:t>
             </a:fld>
             <a:endParaRPr lang="zh-TW" altLang="en-US"/>
           </a:p>
@@ -2819,7 +2819,7 @@
           <a:p>
             <a:fld id="{30C44284-2AA1-45EB-A1F7-78CCFC665AE8}" type="datetime1">
               <a:rPr lang="zh-TW" altLang="en-US" smtClean="0"/>
-              <a:t>2022/10/16</a:t>
+              <a:t>2022/10/18</a:t>
             </a:fld>
             <a:endParaRPr lang="zh-TW" altLang="en-US"/>
           </a:p>
@@ -3107,7 +3107,7 @@
           <a:p>
             <a:fld id="{06D23DE0-8AC8-43F4-8DB7-46CE1472C344}" type="datetime1">
               <a:rPr lang="zh-TW" altLang="en-US" smtClean="0"/>
-              <a:t>2022/10/16</a:t>
+              <a:t>2022/10/18</a:t>
             </a:fld>
             <a:endParaRPr lang="zh-TW" altLang="en-US"/>
           </a:p>
@@ -3348,7 +3348,7 @@
           <a:p>
             <a:fld id="{425C50C4-666D-4D6D-AE33-56CB198A2004}" type="datetime1">
               <a:rPr lang="zh-TW" altLang="en-US" smtClean="0"/>
-              <a:t>2022/10/16</a:t>
+              <a:t>2022/10/18</a:t>
             </a:fld>
             <a:endParaRPr lang="zh-TW" altLang="en-US"/>
           </a:p>
@@ -5016,6 +5016,35 @@
           <a:chExt cx="0" cy="0"/>
         </a:xfrm>
       </p:grpSpPr>
+      <p:pic>
+        <p:nvPicPr>
+          <p:cNvPr id="7" name="圖片 6">
+            <a:extLst>
+              <a:ext uri="{FF2B5EF4-FFF2-40B4-BE49-F238E27FC236}">
+                <a16:creationId xmlns:a16="http://schemas.microsoft.com/office/drawing/2014/main" id="{E6191426-4064-46F6-809B-950FFA636138}"/>
+              </a:ext>
+            </a:extLst>
+          </p:cNvPr>
+          <p:cNvPicPr>
+            <a:picLocks noChangeAspect="1"/>
+          </p:cNvPicPr>
+          <p:nvPr/>
+        </p:nvPicPr>
+        <p:blipFill rotWithShape="1">
+          <a:blip r:embed="rId2"/>
+          <a:srcRect l="2767" t="15798" b="18615"/>
+          <a:stretch/>
+        </p:blipFill>
+        <p:spPr>
+          <a:xfrm>
+            <a:off x="1504907" y="2536318"/>
+            <a:ext cx="9284429" cy="2504070"/>
+          </a:xfrm>
+          <a:prstGeom prst="rect">
+            <a:avLst/>
+          </a:prstGeom>
+        </p:spPr>
+      </p:pic>
       <p:sp>
         <p:nvSpPr>
           <p:cNvPr id="2" name="矩形 1">
@@ -5085,7 +5114,7 @@
           <p:nvPr/>
         </p:nvPicPr>
         <p:blipFill>
-          <a:blip r:embed="rId2" cstate="hqprint">
+          <a:blip r:embed="rId3" cstate="hqprint">
             <a:extLst>
               <a:ext uri="{28A0092B-C50C-407E-A947-70E740481C1C}">
                 <a14:useLocalDpi xmlns:a14="http://schemas.microsoft.com/office/drawing/2010/main" val="0"/>
@@ -5342,160 +5371,110 @@
           </a:p>
         </p:txBody>
       </p:sp>
-      <p:grpSp>
-        <p:nvGrpSpPr>
-          <p:cNvPr id="21" name="群組 20">
-            <a:extLst>
-              <a:ext uri="{FF2B5EF4-FFF2-40B4-BE49-F238E27FC236}">
-                <a16:creationId xmlns:a16="http://schemas.microsoft.com/office/drawing/2014/main" id="{1ACA6992-FE95-4170-A802-1ADDBA32271D}"/>
-              </a:ext>
-            </a:extLst>
-          </p:cNvPr>
-          <p:cNvGrpSpPr/>
+      <p:sp>
+        <p:nvSpPr>
+          <p:cNvPr id="16" name="矩形 15">
+            <a:extLst>
+              <a:ext uri="{FF2B5EF4-FFF2-40B4-BE49-F238E27FC236}">
+                <a16:creationId xmlns:a16="http://schemas.microsoft.com/office/drawing/2014/main" id="{D9816C55-BA57-43EE-93AE-35322AEA0EB7}"/>
+              </a:ext>
+            </a:extLst>
+          </p:cNvPr>
+          <p:cNvSpPr/>
           <p:nvPr/>
-        </p:nvGrpSpPr>
-        <p:grpSpPr>
-          <a:xfrm>
-            <a:off x="1504908" y="2518454"/>
-            <a:ext cx="9182183" cy="2377646"/>
-            <a:chOff x="1504908" y="2518454"/>
-            <a:chExt cx="9182183" cy="2377646"/>
-          </a:xfrm>
-        </p:grpSpPr>
-        <p:pic>
-          <p:nvPicPr>
-            <p:cNvPr id="5" name="圖片 4">
-              <a:extLst>
-                <a:ext uri="{FF2B5EF4-FFF2-40B4-BE49-F238E27FC236}">
-                  <a16:creationId xmlns:a16="http://schemas.microsoft.com/office/drawing/2014/main" id="{C4890211-AACF-489E-BD53-E8F99E48C0D3}"/>
-                </a:ext>
-              </a:extLst>
-            </p:cNvPr>
-            <p:cNvPicPr>
-              <a:picLocks noChangeAspect="1"/>
-            </p:cNvPicPr>
-            <p:nvPr/>
-          </p:nvPicPr>
-          <p:blipFill rotWithShape="1">
-            <a:blip r:embed="rId3"/>
-            <a:srcRect l="4068"/>
-            <a:stretch/>
-          </p:blipFill>
-          <p:spPr>
-            <a:xfrm>
-              <a:off x="1504908" y="2518454"/>
-              <a:ext cx="9182183" cy="2377646"/>
-            </a:xfrm>
-            <a:prstGeom prst="rect">
-              <a:avLst/>
-            </a:prstGeom>
-          </p:spPr>
-        </p:pic>
-        <p:sp>
-          <p:nvSpPr>
-            <p:cNvPr id="16" name="矩形 15">
-              <a:extLst>
-                <a:ext uri="{FF2B5EF4-FFF2-40B4-BE49-F238E27FC236}">
-                  <a16:creationId xmlns:a16="http://schemas.microsoft.com/office/drawing/2014/main" id="{D9816C55-BA57-43EE-93AE-35322AEA0EB7}"/>
-                </a:ext>
-              </a:extLst>
-            </p:cNvPr>
-            <p:cNvSpPr/>
-            <p:nvPr/>
-          </p:nvSpPr>
-          <p:spPr>
-            <a:xfrm>
-              <a:off x="2130286" y="3150704"/>
-              <a:ext cx="3795089" cy="347871"/>
-            </a:xfrm>
-            <a:prstGeom prst="rect">
-              <a:avLst/>
-            </a:prstGeom>
-            <a:noFill/>
-            <a:ln w="38100">
-              <a:solidFill>
-                <a:srgbClr val="FF0000"/>
-              </a:solidFill>
-            </a:ln>
-          </p:spPr>
-          <p:style>
-            <a:lnRef idx="2">
-              <a:schemeClr val="accent1">
-                <a:shade val="50000"/>
-              </a:schemeClr>
-            </a:lnRef>
-            <a:fillRef idx="1">
-              <a:schemeClr val="accent1"/>
-            </a:fillRef>
-            <a:effectRef idx="0">
-              <a:schemeClr val="accent1"/>
-            </a:effectRef>
-            <a:fontRef idx="minor">
-              <a:schemeClr val="lt1"/>
-            </a:fontRef>
-          </p:style>
-          <p:txBody>
-            <a:bodyPr rtlCol="0" anchor="ctr"/>
-            <a:lstStyle/>
-            <a:p>
-              <a:pPr algn="ctr"/>
-              <a:endParaRPr lang="zh-TW" altLang="en-US" dirty="0"/>
-            </a:p>
-          </p:txBody>
-        </p:sp>
-        <p:sp>
-          <p:nvSpPr>
-            <p:cNvPr id="17" name="矩形 16">
-              <a:extLst>
-                <a:ext uri="{FF2B5EF4-FFF2-40B4-BE49-F238E27FC236}">
-                  <a16:creationId xmlns:a16="http://schemas.microsoft.com/office/drawing/2014/main" id="{AFA4A98F-43F5-453E-A1A4-524FD9D46038}"/>
-                </a:ext>
-              </a:extLst>
-            </p:cNvPr>
-            <p:cNvSpPr/>
-            <p:nvPr/>
-          </p:nvSpPr>
-          <p:spPr>
-            <a:xfrm>
-              <a:off x="2123662" y="3496103"/>
-              <a:ext cx="8563429" cy="234384"/>
-            </a:xfrm>
-            <a:prstGeom prst="rect">
-              <a:avLst/>
-            </a:prstGeom>
-            <a:noFill/>
-            <a:ln w="38100">
-              <a:solidFill>
-                <a:srgbClr val="FF0000"/>
-              </a:solidFill>
-            </a:ln>
-          </p:spPr>
-          <p:style>
-            <a:lnRef idx="2">
-              <a:schemeClr val="accent1">
-                <a:shade val="50000"/>
-              </a:schemeClr>
-            </a:lnRef>
-            <a:fillRef idx="1">
-              <a:schemeClr val="accent1"/>
-            </a:fillRef>
-            <a:effectRef idx="0">
-              <a:schemeClr val="accent1"/>
-            </a:effectRef>
-            <a:fontRef idx="minor">
-              <a:schemeClr val="lt1"/>
-            </a:fontRef>
-          </p:style>
-          <p:txBody>
-            <a:bodyPr rtlCol="0" anchor="ctr"/>
-            <a:lstStyle/>
-            <a:p>
-              <a:pPr algn="ctr"/>
-              <a:endParaRPr lang="zh-TW" altLang="en-US" dirty="0"/>
-            </a:p>
-          </p:txBody>
-        </p:sp>
-      </p:grpSp>
+        </p:nvSpPr>
+        <p:spPr>
+          <a:xfrm>
+            <a:off x="2160103" y="3150704"/>
+            <a:ext cx="3795089" cy="347871"/>
+          </a:xfrm>
+          <a:prstGeom prst="rect">
+            <a:avLst/>
+          </a:prstGeom>
+          <a:noFill/>
+          <a:ln w="38100">
+            <a:solidFill>
+              <a:srgbClr val="FF0000"/>
+            </a:solidFill>
+          </a:ln>
+        </p:spPr>
+        <p:style>
+          <a:lnRef idx="2">
+            <a:schemeClr val="accent1">
+              <a:shade val="50000"/>
+            </a:schemeClr>
+          </a:lnRef>
+          <a:fillRef idx="1">
+            <a:schemeClr val="accent1"/>
+          </a:fillRef>
+          <a:effectRef idx="0">
+            <a:schemeClr val="accent1"/>
+          </a:effectRef>
+          <a:fontRef idx="minor">
+            <a:schemeClr val="lt1"/>
+          </a:fontRef>
+        </p:style>
+        <p:txBody>
+          <a:bodyPr rtlCol="0" anchor="ctr"/>
+          <a:lstStyle/>
+          <a:p>
+            <a:pPr algn="ctr"/>
+            <a:endParaRPr lang="zh-TW" altLang="en-US" dirty="0"/>
+          </a:p>
+        </p:txBody>
+      </p:sp>
+      <p:sp>
+        <p:nvSpPr>
+          <p:cNvPr id="17" name="矩形 16">
+            <a:extLst>
+              <a:ext uri="{FF2B5EF4-FFF2-40B4-BE49-F238E27FC236}">
+                <a16:creationId xmlns:a16="http://schemas.microsoft.com/office/drawing/2014/main" id="{AFA4A98F-43F5-453E-A1A4-524FD9D46038}"/>
+              </a:ext>
+            </a:extLst>
+          </p:cNvPr>
+          <p:cNvSpPr/>
+          <p:nvPr/>
+        </p:nvSpPr>
+        <p:spPr>
+          <a:xfrm>
+            <a:off x="2153479" y="3496103"/>
+            <a:ext cx="8563429" cy="234384"/>
+          </a:xfrm>
+          <a:prstGeom prst="rect">
+            <a:avLst/>
+          </a:prstGeom>
+          <a:noFill/>
+          <a:ln w="38100">
+            <a:solidFill>
+              <a:srgbClr val="FF0000"/>
+            </a:solidFill>
+          </a:ln>
+        </p:spPr>
+        <p:style>
+          <a:lnRef idx="2">
+            <a:schemeClr val="accent1">
+              <a:shade val="50000"/>
+            </a:schemeClr>
+          </a:lnRef>
+          <a:fillRef idx="1">
+            <a:schemeClr val="accent1"/>
+          </a:fillRef>
+          <a:effectRef idx="0">
+            <a:schemeClr val="accent1"/>
+          </a:effectRef>
+          <a:fontRef idx="minor">
+            <a:schemeClr val="lt1"/>
+          </a:fontRef>
+        </p:style>
+        <p:txBody>
+          <a:bodyPr rtlCol="0" anchor="ctr"/>
+          <a:lstStyle/>
+          <a:p>
+            <a:pPr algn="ctr"/>
+            <a:endParaRPr lang="zh-TW" altLang="en-US" dirty="0"/>
+          </a:p>
+        </p:txBody>
+      </p:sp>
       <mc:AlternateContent xmlns:mc="http://schemas.openxmlformats.org/markup-compatibility/2006" xmlns:a14="http://schemas.microsoft.com/office/drawing/2010/main">
         <mc:Choice Requires="a14">
           <p:sp>

</xml_diff>